<commit_message>
Slide bai 1, Gioi thieu automation test, update font slide
</commit_message>
<xml_diff>
--- a/documents/slides/Bai 1 - Gioi thieu ve automation test va selenium webdriver.pptx
+++ b/documents/slides/Bai 1 - Gioi thieu ve automation test va selenium webdriver.pptx
@@ -2,7 +2,7 @@
 <file path=ppt/presentation.xml><?xml version="1.0" encoding="utf-8"?>
 <p:presentation xmlns:a="http://schemas.openxmlformats.org/drawingml/2006/main" xmlns:r="http://schemas.openxmlformats.org/officeDocument/2006/relationships" xmlns:p="http://schemas.openxmlformats.org/presentationml/2006/main" saveSubsetFonts="1">
   <p:sldMasterIdLst>
-    <p:sldMasterId id="2147483648" r:id="rId1"/>
+    <p:sldMasterId id="2147483660" r:id="rId1"/>
   </p:sldMasterIdLst>
   <p:sldIdLst>
     <p:sldId id="256" r:id="rId2"/>
@@ -116,11 +116,16 @@
       </a:defRPr>
     </a:lvl9pPr>
   </p:defaultTextStyle>
+  <p:extLst>
+    <p:ext uri="{EFAFB233-063F-42B5-8137-9DF3F51BA10A}">
+      <p15:sldGuideLst xmlns:p15="http://schemas.microsoft.com/office/powerpoint/2012/main"/>
+    </p:ext>
+  </p:extLst>
 </p:presentation>
 </file>
 
 <file path=ppt/slideLayouts/slideLayout1.xml><?xml version="1.0" encoding="utf-8"?>
-<p:sldLayout xmlns:a="http://schemas.openxmlformats.org/drawingml/2006/main" xmlns:r="http://schemas.openxmlformats.org/officeDocument/2006/relationships" xmlns:p="http://schemas.openxmlformats.org/presentationml/2006/main" type="title" preserve="1">
+<p:sldLayout xmlns:a="http://schemas.openxmlformats.org/drawingml/2006/main" xmlns:r="http://schemas.openxmlformats.org/officeDocument/2006/relationships" xmlns:p="http://schemas.openxmlformats.org/presentationml/2006/main" showMasterSp="0" type="title" preserve="1">
   <p:cSld name="Title Slide">
     <p:spTree>
       <p:nvGrpSpPr>
@@ -136,6 +141,536 @@
           <a:chExt cx="0" cy="0"/>
         </a:xfrm>
       </p:grpSpPr>
+      <p:grpSp>
+        <p:nvGrpSpPr>
+          <p:cNvPr id="7" name="Group 6"/>
+          <p:cNvGrpSpPr/>
+          <p:nvPr/>
+        </p:nvGrpSpPr>
+        <p:grpSpPr>
+          <a:xfrm>
+            <a:off x="0" y="-8467"/>
+            <a:ext cx="12192000" cy="6866467"/>
+            <a:chOff x="0" y="-8467"/>
+            <a:chExt cx="12192000" cy="6866467"/>
+          </a:xfrm>
+        </p:grpSpPr>
+        <p:cxnSp>
+          <p:nvCxnSpPr>
+            <p:cNvPr id="32" name="Straight Connector 31"/>
+            <p:cNvCxnSpPr/>
+            <p:nvPr/>
+          </p:nvCxnSpPr>
+          <p:spPr>
+            <a:xfrm>
+              <a:off x="9371012" y="0"/>
+              <a:ext cx="1219200" cy="6858000"/>
+            </a:xfrm>
+            <a:prstGeom prst="line">
+              <a:avLst/>
+            </a:prstGeom>
+            <a:ln w="9525">
+              <a:solidFill>
+                <a:schemeClr val="bg1">
+                  <a:lumMod val="75000"/>
+                </a:schemeClr>
+              </a:solidFill>
+            </a:ln>
+          </p:spPr>
+          <p:style>
+            <a:lnRef idx="2">
+              <a:schemeClr val="accent1"/>
+            </a:lnRef>
+            <a:fillRef idx="0">
+              <a:schemeClr val="accent1"/>
+            </a:fillRef>
+            <a:effectRef idx="1">
+              <a:schemeClr val="accent1"/>
+            </a:effectRef>
+            <a:fontRef idx="minor">
+              <a:schemeClr val="tx1"/>
+            </a:fontRef>
+          </p:style>
+        </p:cxnSp>
+        <p:cxnSp>
+          <p:nvCxnSpPr>
+            <p:cNvPr id="21" name="Straight Connector 20"/>
+            <p:cNvCxnSpPr/>
+            <p:nvPr/>
+          </p:nvCxnSpPr>
+          <p:spPr>
+            <a:xfrm flipH="1">
+              <a:off x="7425267" y="3681413"/>
+              <a:ext cx="4763558" cy="3176587"/>
+            </a:xfrm>
+            <a:prstGeom prst="line">
+              <a:avLst/>
+            </a:prstGeom>
+            <a:ln w="9525">
+              <a:solidFill>
+                <a:schemeClr val="bg1">
+                  <a:lumMod val="85000"/>
+                </a:schemeClr>
+              </a:solidFill>
+            </a:ln>
+          </p:spPr>
+          <p:style>
+            <a:lnRef idx="2">
+              <a:schemeClr val="accent1"/>
+            </a:lnRef>
+            <a:fillRef idx="0">
+              <a:schemeClr val="accent1"/>
+            </a:fillRef>
+            <a:effectRef idx="1">
+              <a:schemeClr val="accent1"/>
+            </a:effectRef>
+            <a:fontRef idx="minor">
+              <a:schemeClr val="tx1"/>
+            </a:fontRef>
+          </p:style>
+        </p:cxnSp>
+        <p:sp>
+          <p:nvSpPr>
+            <p:cNvPr id="24" name="Rectangle 23"/>
+            <p:cNvSpPr/>
+            <p:nvPr/>
+          </p:nvSpPr>
+          <p:spPr>
+            <a:xfrm>
+              <a:off x="9181476" y="-8467"/>
+              <a:ext cx="3007349" cy="6866467"/>
+            </a:xfrm>
+            <a:custGeom>
+              <a:avLst/>
+              <a:gdLst/>
+              <a:ahLst/>
+              <a:cxnLst/>
+              <a:rect l="l" t="t" r="r" b="b"/>
+              <a:pathLst>
+                <a:path w="3007349" h="6866467">
+                  <a:moveTo>
+                    <a:pt x="2045532" y="0"/>
+                  </a:moveTo>
+                  <a:lnTo>
+                    <a:pt x="3007349" y="0"/>
+                  </a:lnTo>
+                  <a:lnTo>
+                    <a:pt x="3007349" y="6866467"/>
+                  </a:lnTo>
+                  <a:lnTo>
+                    <a:pt x="0" y="6866467"/>
+                  </a:lnTo>
+                  <a:lnTo>
+                    <a:pt x="2045532" y="0"/>
+                  </a:lnTo>
+                  <a:close/>
+                </a:path>
+              </a:pathLst>
+            </a:custGeom>
+            <a:solidFill>
+              <a:schemeClr val="accent1">
+                <a:alpha val="30000"/>
+              </a:schemeClr>
+            </a:solidFill>
+            <a:ln>
+              <a:noFill/>
+            </a:ln>
+            <a:effectLst/>
+          </p:spPr>
+          <p:style>
+            <a:lnRef idx="1">
+              <a:schemeClr val="accent1"/>
+            </a:lnRef>
+            <a:fillRef idx="3">
+              <a:schemeClr val="accent1"/>
+            </a:fillRef>
+            <a:effectRef idx="2">
+              <a:schemeClr val="accent1"/>
+            </a:effectRef>
+            <a:fontRef idx="minor">
+              <a:schemeClr val="lt1"/>
+            </a:fontRef>
+          </p:style>
+        </p:sp>
+        <p:sp>
+          <p:nvSpPr>
+            <p:cNvPr id="26" name="Rectangle 25"/>
+            <p:cNvSpPr/>
+            <p:nvPr/>
+          </p:nvSpPr>
+          <p:spPr>
+            <a:xfrm>
+              <a:off x="9603442" y="-8467"/>
+              <a:ext cx="2588558" cy="6866467"/>
+            </a:xfrm>
+            <a:custGeom>
+              <a:avLst/>
+              <a:gdLst/>
+              <a:ahLst/>
+              <a:cxnLst/>
+              <a:rect l="l" t="t" r="r" b="b"/>
+              <a:pathLst>
+                <a:path w="2573311" h="6866467">
+                  <a:moveTo>
+                    <a:pt x="0" y="0"/>
+                  </a:moveTo>
+                  <a:lnTo>
+                    <a:pt x="2573311" y="0"/>
+                  </a:lnTo>
+                  <a:lnTo>
+                    <a:pt x="2573311" y="6866467"/>
+                  </a:lnTo>
+                  <a:lnTo>
+                    <a:pt x="1202336" y="6866467"/>
+                  </a:lnTo>
+                  <a:lnTo>
+                    <a:pt x="0" y="0"/>
+                  </a:lnTo>
+                  <a:close/>
+                </a:path>
+              </a:pathLst>
+            </a:custGeom>
+            <a:solidFill>
+              <a:schemeClr val="accent1">
+                <a:alpha val="20000"/>
+              </a:schemeClr>
+            </a:solidFill>
+            <a:ln>
+              <a:noFill/>
+            </a:ln>
+            <a:effectLst/>
+          </p:spPr>
+          <p:style>
+            <a:lnRef idx="1">
+              <a:schemeClr val="accent1"/>
+            </a:lnRef>
+            <a:fillRef idx="3">
+              <a:schemeClr val="accent1"/>
+            </a:fillRef>
+            <a:effectRef idx="2">
+              <a:schemeClr val="accent1"/>
+            </a:effectRef>
+            <a:fontRef idx="minor">
+              <a:schemeClr val="lt1"/>
+            </a:fontRef>
+          </p:style>
+        </p:sp>
+        <p:sp>
+          <p:nvSpPr>
+            <p:cNvPr id="27" name="Isosceles Triangle 26"/>
+            <p:cNvSpPr/>
+            <p:nvPr/>
+          </p:nvSpPr>
+          <p:spPr>
+            <a:xfrm>
+              <a:off x="8932333" y="3048000"/>
+              <a:ext cx="3259667" cy="3810000"/>
+            </a:xfrm>
+            <a:prstGeom prst="triangle">
+              <a:avLst>
+                <a:gd name="adj" fmla="val 100000"/>
+              </a:avLst>
+            </a:prstGeom>
+            <a:solidFill>
+              <a:schemeClr val="accent2">
+                <a:alpha val="72000"/>
+              </a:schemeClr>
+            </a:solidFill>
+            <a:ln>
+              <a:noFill/>
+            </a:ln>
+            <a:effectLst/>
+          </p:spPr>
+          <p:style>
+            <a:lnRef idx="1">
+              <a:schemeClr val="accent1"/>
+            </a:lnRef>
+            <a:fillRef idx="3">
+              <a:schemeClr val="accent1"/>
+            </a:fillRef>
+            <a:effectRef idx="2">
+              <a:schemeClr val="accent1"/>
+            </a:effectRef>
+            <a:fontRef idx="minor">
+              <a:schemeClr val="lt1"/>
+            </a:fontRef>
+          </p:style>
+        </p:sp>
+        <p:sp>
+          <p:nvSpPr>
+            <p:cNvPr id="28" name="Rectangle 27"/>
+            <p:cNvSpPr/>
+            <p:nvPr/>
+          </p:nvSpPr>
+          <p:spPr>
+            <a:xfrm>
+              <a:off x="9334500" y="-8467"/>
+              <a:ext cx="2854326" cy="6866467"/>
+            </a:xfrm>
+            <a:custGeom>
+              <a:avLst/>
+              <a:gdLst/>
+              <a:ahLst/>
+              <a:cxnLst/>
+              <a:rect l="l" t="t" r="r" b="b"/>
+              <a:pathLst>
+                <a:path w="2858013" h="6866467">
+                  <a:moveTo>
+                    <a:pt x="0" y="0"/>
+                  </a:moveTo>
+                  <a:lnTo>
+                    <a:pt x="2858013" y="0"/>
+                  </a:lnTo>
+                  <a:lnTo>
+                    <a:pt x="2858013" y="6866467"/>
+                  </a:lnTo>
+                  <a:lnTo>
+                    <a:pt x="2473942" y="6866467"/>
+                  </a:lnTo>
+                  <a:lnTo>
+                    <a:pt x="0" y="0"/>
+                  </a:lnTo>
+                  <a:close/>
+                </a:path>
+              </a:pathLst>
+            </a:custGeom>
+            <a:solidFill>
+              <a:schemeClr val="accent2">
+                <a:lumMod val="75000"/>
+                <a:alpha val="70000"/>
+              </a:schemeClr>
+            </a:solidFill>
+            <a:ln>
+              <a:noFill/>
+            </a:ln>
+            <a:effectLst/>
+          </p:spPr>
+          <p:style>
+            <a:lnRef idx="1">
+              <a:schemeClr val="accent1"/>
+            </a:lnRef>
+            <a:fillRef idx="3">
+              <a:schemeClr val="accent1"/>
+            </a:fillRef>
+            <a:effectRef idx="2">
+              <a:schemeClr val="accent1"/>
+            </a:effectRef>
+            <a:fontRef idx="minor">
+              <a:schemeClr val="lt1"/>
+            </a:fontRef>
+          </p:style>
+        </p:sp>
+        <p:sp>
+          <p:nvSpPr>
+            <p:cNvPr id="29" name="Rectangle 28"/>
+            <p:cNvSpPr/>
+            <p:nvPr/>
+          </p:nvSpPr>
+          <p:spPr>
+            <a:xfrm>
+              <a:off x="10898730" y="-8467"/>
+              <a:ext cx="1290094" cy="6866467"/>
+            </a:xfrm>
+            <a:custGeom>
+              <a:avLst/>
+              <a:gdLst/>
+              <a:ahLst/>
+              <a:cxnLst/>
+              <a:rect l="l" t="t" r="r" b="b"/>
+              <a:pathLst>
+                <a:path w="1290094" h="6858000">
+                  <a:moveTo>
+                    <a:pt x="1019735" y="0"/>
+                  </a:moveTo>
+                  <a:lnTo>
+                    <a:pt x="1290094" y="0"/>
+                  </a:lnTo>
+                  <a:lnTo>
+                    <a:pt x="1290094" y="6858000"/>
+                  </a:lnTo>
+                  <a:lnTo>
+                    <a:pt x="0" y="6858000"/>
+                  </a:lnTo>
+                  <a:lnTo>
+                    <a:pt x="1019735" y="0"/>
+                  </a:lnTo>
+                  <a:close/>
+                </a:path>
+              </a:pathLst>
+            </a:custGeom>
+            <a:solidFill>
+              <a:schemeClr val="accent1">
+                <a:lumMod val="60000"/>
+                <a:lumOff val="40000"/>
+                <a:alpha val="70000"/>
+              </a:schemeClr>
+            </a:solidFill>
+            <a:ln>
+              <a:noFill/>
+            </a:ln>
+            <a:effectLst/>
+          </p:spPr>
+          <p:style>
+            <a:lnRef idx="1">
+              <a:schemeClr val="accent1"/>
+            </a:lnRef>
+            <a:fillRef idx="3">
+              <a:schemeClr val="accent1"/>
+            </a:fillRef>
+            <a:effectRef idx="2">
+              <a:schemeClr val="accent1"/>
+            </a:effectRef>
+            <a:fontRef idx="minor">
+              <a:schemeClr val="lt1"/>
+            </a:fontRef>
+          </p:style>
+        </p:sp>
+        <p:sp>
+          <p:nvSpPr>
+            <p:cNvPr id="30" name="Rectangle 29"/>
+            <p:cNvSpPr/>
+            <p:nvPr/>
+          </p:nvSpPr>
+          <p:spPr>
+            <a:xfrm>
+              <a:off x="10938999" y="-8467"/>
+              <a:ext cx="1249825" cy="6866467"/>
+            </a:xfrm>
+            <a:custGeom>
+              <a:avLst/>
+              <a:gdLst/>
+              <a:ahLst/>
+              <a:cxnLst/>
+              <a:rect l="l" t="t" r="r" b="b"/>
+              <a:pathLst>
+                <a:path w="1249825" h="6858000">
+                  <a:moveTo>
+                    <a:pt x="0" y="0"/>
+                  </a:moveTo>
+                  <a:lnTo>
+                    <a:pt x="1249825" y="0"/>
+                  </a:lnTo>
+                  <a:lnTo>
+                    <a:pt x="1249825" y="6858000"/>
+                  </a:lnTo>
+                  <a:lnTo>
+                    <a:pt x="1109382" y="6858000"/>
+                  </a:lnTo>
+                  <a:lnTo>
+                    <a:pt x="0" y="0"/>
+                  </a:lnTo>
+                  <a:close/>
+                </a:path>
+              </a:pathLst>
+            </a:custGeom>
+            <a:solidFill>
+              <a:schemeClr val="accent1">
+                <a:alpha val="65000"/>
+              </a:schemeClr>
+            </a:solidFill>
+            <a:ln>
+              <a:noFill/>
+            </a:ln>
+            <a:effectLst/>
+          </p:spPr>
+          <p:style>
+            <a:lnRef idx="1">
+              <a:schemeClr val="accent1"/>
+            </a:lnRef>
+            <a:fillRef idx="3">
+              <a:schemeClr val="accent1"/>
+            </a:fillRef>
+            <a:effectRef idx="2">
+              <a:schemeClr val="accent1"/>
+            </a:effectRef>
+            <a:fontRef idx="minor">
+              <a:schemeClr val="lt1"/>
+            </a:fontRef>
+          </p:style>
+        </p:sp>
+        <p:sp>
+          <p:nvSpPr>
+            <p:cNvPr id="31" name="Isosceles Triangle 30"/>
+            <p:cNvSpPr/>
+            <p:nvPr/>
+          </p:nvSpPr>
+          <p:spPr>
+            <a:xfrm>
+              <a:off x="10371666" y="3589867"/>
+              <a:ext cx="1817159" cy="3268133"/>
+            </a:xfrm>
+            <a:prstGeom prst="triangle">
+              <a:avLst>
+                <a:gd name="adj" fmla="val 100000"/>
+              </a:avLst>
+            </a:prstGeom>
+            <a:solidFill>
+              <a:schemeClr val="accent1">
+                <a:alpha val="80000"/>
+              </a:schemeClr>
+            </a:solidFill>
+            <a:ln>
+              <a:noFill/>
+            </a:ln>
+            <a:effectLst/>
+          </p:spPr>
+          <p:style>
+            <a:lnRef idx="1">
+              <a:schemeClr val="accent1"/>
+            </a:lnRef>
+            <a:fillRef idx="3">
+              <a:schemeClr val="accent1"/>
+            </a:fillRef>
+            <a:effectRef idx="2">
+              <a:schemeClr val="accent1"/>
+            </a:effectRef>
+            <a:fontRef idx="minor">
+              <a:schemeClr val="lt1"/>
+            </a:fontRef>
+          </p:style>
+        </p:sp>
+        <p:sp>
+          <p:nvSpPr>
+            <p:cNvPr id="19" name="Isosceles Triangle 18"/>
+            <p:cNvSpPr/>
+            <p:nvPr/>
+          </p:nvSpPr>
+          <p:spPr>
+            <a:xfrm rot="10800000">
+              <a:off x="0" y="0"/>
+              <a:ext cx="842596" cy="5666154"/>
+            </a:xfrm>
+            <a:prstGeom prst="triangle">
+              <a:avLst>
+                <a:gd name="adj" fmla="val 100000"/>
+              </a:avLst>
+            </a:prstGeom>
+            <a:solidFill>
+              <a:schemeClr val="accent1">
+                <a:alpha val="85000"/>
+              </a:schemeClr>
+            </a:solidFill>
+            <a:ln>
+              <a:noFill/>
+            </a:ln>
+            <a:effectLst/>
+          </p:spPr>
+          <p:style>
+            <a:lnRef idx="1">
+              <a:schemeClr val="accent1"/>
+            </a:lnRef>
+            <a:fillRef idx="3">
+              <a:schemeClr val="accent1"/>
+            </a:fillRef>
+            <a:effectRef idx="2">
+              <a:schemeClr val="accent1"/>
+            </a:effectRef>
+            <a:fontRef idx="minor">
+              <a:schemeClr val="lt1"/>
+            </a:fontRef>
+          </p:style>
+        </p:sp>
+      </p:grpSp>
       <p:sp>
         <p:nvSpPr>
           <p:cNvPr id="2" name="Title 1"/>
@@ -148,15 +683,21 @@
         </p:nvSpPr>
         <p:spPr>
           <a:xfrm>
-            <a:off x="1524000" y="1122363"/>
-            <a:ext cx="9144000" cy="2387600"/>
+            <a:off x="1507067" y="2404534"/>
+            <a:ext cx="7766936" cy="1646302"/>
           </a:xfrm>
         </p:spPr>
         <p:txBody>
-          <a:bodyPr anchor="b"/>
+          <a:bodyPr anchor="b">
+            <a:noAutofit/>
+          </a:bodyPr>
           <a:lstStyle>
-            <a:lvl1pPr algn="ctr">
-              <a:defRPr sz="6000"/>
+            <a:lvl1pPr algn="r">
+              <a:defRPr sz="5400">
+                <a:solidFill>
+                  <a:schemeClr val="accent1"/>
+                </a:solidFill>
+              </a:defRPr>
             </a:lvl1pPr>
           </a:lstStyle>
           <a:p>
@@ -164,7 +705,7 @@
               <a:rPr lang="en-US" smtClean="0"/>
               <a:t>Click to edit Master title style</a:t>
             </a:r>
-            <a:endParaRPr lang="en-US"/>
+            <a:endParaRPr lang="en-US" dirty="0"/>
           </a:p>
         </p:txBody>
       </p:sp>
@@ -180,48 +721,103 @@
         </p:nvSpPr>
         <p:spPr>
           <a:xfrm>
-            <a:off x="1524000" y="3602038"/>
-            <a:ext cx="9144000" cy="1655762"/>
+            <a:off x="1507067" y="4050833"/>
+            <a:ext cx="7766936" cy="1096899"/>
           </a:xfrm>
         </p:spPr>
         <p:txBody>
-          <a:bodyPr/>
+          <a:bodyPr anchor="t"/>
           <a:lstStyle>
-            <a:lvl1pPr marL="0" indent="0" algn="ctr">
-              <a:buNone/>
-              <a:defRPr sz="2400"/>
+            <a:lvl1pPr marL="0" indent="0" algn="r">
+              <a:buNone/>
+              <a:defRPr>
+                <a:solidFill>
+                  <a:schemeClr val="tx1">
+                    <a:lumMod val="50000"/>
+                    <a:lumOff val="50000"/>
+                  </a:schemeClr>
+                </a:solidFill>
+              </a:defRPr>
             </a:lvl1pPr>
             <a:lvl2pPr marL="457200" indent="0" algn="ctr">
               <a:buNone/>
-              <a:defRPr sz="2000"/>
+              <a:defRPr>
+                <a:solidFill>
+                  <a:schemeClr val="tx1">
+                    <a:tint val="75000"/>
+                  </a:schemeClr>
+                </a:solidFill>
+              </a:defRPr>
             </a:lvl2pPr>
             <a:lvl3pPr marL="914400" indent="0" algn="ctr">
               <a:buNone/>
-              <a:defRPr sz="1800"/>
+              <a:defRPr>
+                <a:solidFill>
+                  <a:schemeClr val="tx1">
+                    <a:tint val="75000"/>
+                  </a:schemeClr>
+                </a:solidFill>
+              </a:defRPr>
             </a:lvl3pPr>
             <a:lvl4pPr marL="1371600" indent="0" algn="ctr">
               <a:buNone/>
-              <a:defRPr sz="1600"/>
+              <a:defRPr>
+                <a:solidFill>
+                  <a:schemeClr val="tx1">
+                    <a:tint val="75000"/>
+                  </a:schemeClr>
+                </a:solidFill>
+              </a:defRPr>
             </a:lvl4pPr>
             <a:lvl5pPr marL="1828800" indent="0" algn="ctr">
               <a:buNone/>
-              <a:defRPr sz="1600"/>
+              <a:defRPr>
+                <a:solidFill>
+                  <a:schemeClr val="tx1">
+                    <a:tint val="75000"/>
+                  </a:schemeClr>
+                </a:solidFill>
+              </a:defRPr>
             </a:lvl5pPr>
             <a:lvl6pPr marL="2286000" indent="0" algn="ctr">
               <a:buNone/>
-              <a:defRPr sz="1600"/>
+              <a:defRPr>
+                <a:solidFill>
+                  <a:schemeClr val="tx1">
+                    <a:tint val="75000"/>
+                  </a:schemeClr>
+                </a:solidFill>
+              </a:defRPr>
             </a:lvl6pPr>
             <a:lvl7pPr marL="2743200" indent="0" algn="ctr">
               <a:buNone/>
-              <a:defRPr sz="1600"/>
+              <a:defRPr>
+                <a:solidFill>
+                  <a:schemeClr val="tx1">
+                    <a:tint val="75000"/>
+                  </a:schemeClr>
+                </a:solidFill>
+              </a:defRPr>
             </a:lvl7pPr>
             <a:lvl8pPr marL="3200400" indent="0" algn="ctr">
               <a:buNone/>
-              <a:defRPr sz="1600"/>
+              <a:defRPr>
+                <a:solidFill>
+                  <a:schemeClr val="tx1">
+                    <a:tint val="75000"/>
+                  </a:schemeClr>
+                </a:solidFill>
+              </a:defRPr>
             </a:lvl8pPr>
             <a:lvl9pPr marL="3657600" indent="0" algn="ctr">
               <a:buNone/>
-              <a:defRPr sz="1600"/>
+              <a:defRPr>
+                <a:solidFill>
+                  <a:schemeClr val="tx1">
+                    <a:tint val="75000"/>
+                  </a:schemeClr>
+                </a:solidFill>
+              </a:defRPr>
             </a:lvl9pPr>
           </a:lstStyle>
           <a:p>
@@ -229,7 +825,7 @@
               <a:rPr lang="en-US" smtClean="0"/>
               <a:t>Click to edit Master subtitle style</a:t>
             </a:r>
-            <a:endParaRPr lang="en-US"/>
+            <a:endParaRPr lang="en-US" dirty="0"/>
           </a:p>
         </p:txBody>
       </p:sp>
@@ -301,7 +897,7 @@
     </p:spTree>
     <p:extLst>
       <p:ext uri="{BB962C8B-B14F-4D97-AF65-F5344CB8AC3E}">
-        <p14:creationId xmlns:p14="http://schemas.microsoft.com/office/powerpoint/2010/main" val="1771187452"/>
+        <p14:creationId xmlns:p14="http://schemas.microsoft.com/office/powerpoint/2010/main" val="2190279657"/>
       </p:ext>
     </p:extLst>
   </p:cSld>
@@ -312,6 +908,1619 @@
 </file>
 
 <file path=ppt/slideLayouts/slideLayout10.xml><?xml version="1.0" encoding="utf-8"?>
+<p:sldLayout xmlns:a="http://schemas.openxmlformats.org/drawingml/2006/main" xmlns:r="http://schemas.openxmlformats.org/officeDocument/2006/relationships" xmlns:p="http://schemas.openxmlformats.org/presentationml/2006/main" preserve="1">
+  <p:cSld name="Title and Caption">
+    <p:spTree>
+      <p:nvGrpSpPr>
+        <p:cNvPr id="1" name=""/>
+        <p:cNvGrpSpPr/>
+        <p:nvPr/>
+      </p:nvGrpSpPr>
+      <p:grpSpPr>
+        <a:xfrm>
+          <a:off x="0" y="0"/>
+          <a:ext cx="0" cy="0"/>
+          <a:chOff x="0" y="0"/>
+          <a:chExt cx="0" cy="0"/>
+        </a:xfrm>
+      </p:grpSpPr>
+      <p:sp>
+        <p:nvSpPr>
+          <p:cNvPr id="2" name="Title 1"/>
+          <p:cNvSpPr>
+            <a:spLocks noGrp="1"/>
+          </p:cNvSpPr>
+          <p:nvPr>
+            <p:ph type="title"/>
+          </p:nvPr>
+        </p:nvSpPr>
+        <p:spPr>
+          <a:xfrm>
+            <a:off x="677335" y="609600"/>
+            <a:ext cx="8596668" cy="3403600"/>
+          </a:xfrm>
+        </p:spPr>
+        <p:txBody>
+          <a:bodyPr anchor="ctr">
+            <a:normAutofit/>
+          </a:bodyPr>
+          <a:lstStyle>
+            <a:lvl1pPr algn="l">
+              <a:defRPr sz="4400" b="0" cap="none"/>
+            </a:lvl1pPr>
+          </a:lstStyle>
+          <a:p>
+            <a:r>
+              <a:rPr lang="en-US" smtClean="0"/>
+              <a:t>Click to edit Master title style</a:t>
+            </a:r>
+            <a:endParaRPr lang="en-US" dirty="0"/>
+          </a:p>
+        </p:txBody>
+      </p:sp>
+      <p:sp>
+        <p:nvSpPr>
+          <p:cNvPr id="3" name="Text Placeholder 2"/>
+          <p:cNvSpPr>
+            <a:spLocks noGrp="1"/>
+          </p:cNvSpPr>
+          <p:nvPr>
+            <p:ph type="body" idx="1"/>
+          </p:nvPr>
+        </p:nvSpPr>
+        <p:spPr>
+          <a:xfrm>
+            <a:off x="677335" y="4470400"/>
+            <a:ext cx="8596668" cy="1570962"/>
+          </a:xfrm>
+        </p:spPr>
+        <p:txBody>
+          <a:bodyPr anchor="ctr">
+            <a:normAutofit/>
+          </a:bodyPr>
+          <a:lstStyle>
+            <a:lvl1pPr marL="0" indent="0" algn="l">
+              <a:buNone/>
+              <a:defRPr sz="1800">
+                <a:solidFill>
+                  <a:schemeClr val="tx1">
+                    <a:lumMod val="75000"/>
+                    <a:lumOff val="25000"/>
+                  </a:schemeClr>
+                </a:solidFill>
+              </a:defRPr>
+            </a:lvl1pPr>
+            <a:lvl2pPr marL="457200" indent="0">
+              <a:buNone/>
+              <a:defRPr sz="1800">
+                <a:solidFill>
+                  <a:schemeClr val="tx1">
+                    <a:tint val="75000"/>
+                  </a:schemeClr>
+                </a:solidFill>
+              </a:defRPr>
+            </a:lvl2pPr>
+            <a:lvl3pPr marL="914400" indent="0">
+              <a:buNone/>
+              <a:defRPr sz="1600">
+                <a:solidFill>
+                  <a:schemeClr val="tx1">
+                    <a:tint val="75000"/>
+                  </a:schemeClr>
+                </a:solidFill>
+              </a:defRPr>
+            </a:lvl3pPr>
+            <a:lvl4pPr marL="1371600" indent="0">
+              <a:buNone/>
+              <a:defRPr sz="1400">
+                <a:solidFill>
+                  <a:schemeClr val="tx1">
+                    <a:tint val="75000"/>
+                  </a:schemeClr>
+                </a:solidFill>
+              </a:defRPr>
+            </a:lvl4pPr>
+            <a:lvl5pPr marL="1828800" indent="0">
+              <a:buNone/>
+              <a:defRPr sz="1400">
+                <a:solidFill>
+                  <a:schemeClr val="tx1">
+                    <a:tint val="75000"/>
+                  </a:schemeClr>
+                </a:solidFill>
+              </a:defRPr>
+            </a:lvl5pPr>
+            <a:lvl6pPr marL="2286000" indent="0">
+              <a:buNone/>
+              <a:defRPr sz="1400">
+                <a:solidFill>
+                  <a:schemeClr val="tx1">
+                    <a:tint val="75000"/>
+                  </a:schemeClr>
+                </a:solidFill>
+              </a:defRPr>
+            </a:lvl6pPr>
+            <a:lvl7pPr marL="2743200" indent="0">
+              <a:buNone/>
+              <a:defRPr sz="1400">
+                <a:solidFill>
+                  <a:schemeClr val="tx1">
+                    <a:tint val="75000"/>
+                  </a:schemeClr>
+                </a:solidFill>
+              </a:defRPr>
+            </a:lvl7pPr>
+            <a:lvl8pPr marL="3200400" indent="0">
+              <a:buNone/>
+              <a:defRPr sz="1400">
+                <a:solidFill>
+                  <a:schemeClr val="tx1">
+                    <a:tint val="75000"/>
+                  </a:schemeClr>
+                </a:solidFill>
+              </a:defRPr>
+            </a:lvl8pPr>
+            <a:lvl9pPr marL="3657600" indent="0">
+              <a:buNone/>
+              <a:defRPr sz="1400">
+                <a:solidFill>
+                  <a:schemeClr val="tx1">
+                    <a:tint val="75000"/>
+                  </a:schemeClr>
+                </a:solidFill>
+              </a:defRPr>
+            </a:lvl9pPr>
+          </a:lstStyle>
+          <a:p>
+            <a:pPr lvl="0"/>
+            <a:r>
+              <a:rPr lang="en-US" smtClean="0"/>
+              <a:t>Edit Master text styles</a:t>
+            </a:r>
+          </a:p>
+        </p:txBody>
+      </p:sp>
+      <p:sp>
+        <p:nvSpPr>
+          <p:cNvPr id="4" name="Date Placeholder 3"/>
+          <p:cNvSpPr>
+            <a:spLocks noGrp="1"/>
+          </p:cNvSpPr>
+          <p:nvPr>
+            <p:ph type="dt" sz="half" idx="10"/>
+          </p:nvPr>
+        </p:nvSpPr>
+        <p:spPr/>
+        <p:txBody>
+          <a:bodyPr/>
+          <a:lstStyle/>
+          <a:p>
+            <a:fld id="{CC087BCE-F3E1-4AF0-BC5A-1334C9720243}" type="datetimeFigureOut">
+              <a:rPr lang="en-US" smtClean="0"/>
+              <a:t>5/27/2020</a:t>
+            </a:fld>
+            <a:endParaRPr lang="en-US"/>
+          </a:p>
+        </p:txBody>
+      </p:sp>
+      <p:sp>
+        <p:nvSpPr>
+          <p:cNvPr id="5" name="Footer Placeholder 4"/>
+          <p:cNvSpPr>
+            <a:spLocks noGrp="1"/>
+          </p:cNvSpPr>
+          <p:nvPr>
+            <p:ph type="ftr" sz="quarter" idx="11"/>
+          </p:nvPr>
+        </p:nvSpPr>
+        <p:spPr/>
+        <p:txBody>
+          <a:bodyPr/>
+          <a:lstStyle/>
+          <a:p>
+            <a:endParaRPr lang="en-US"/>
+          </a:p>
+        </p:txBody>
+      </p:sp>
+      <p:sp>
+        <p:nvSpPr>
+          <p:cNvPr id="6" name="Slide Number Placeholder 5"/>
+          <p:cNvSpPr>
+            <a:spLocks noGrp="1"/>
+          </p:cNvSpPr>
+          <p:nvPr>
+            <p:ph type="sldNum" sz="quarter" idx="12"/>
+          </p:nvPr>
+        </p:nvSpPr>
+        <p:spPr/>
+        <p:txBody>
+          <a:bodyPr/>
+          <a:lstStyle/>
+          <a:p>
+            <a:fld id="{2F97D728-71DB-4E74-8014-C86D43ABD4F9}" type="slidenum">
+              <a:rPr lang="en-US" smtClean="0"/>
+              <a:t>‹#›</a:t>
+            </a:fld>
+            <a:endParaRPr lang="en-US"/>
+          </a:p>
+        </p:txBody>
+      </p:sp>
+    </p:spTree>
+    <p:extLst>
+      <p:ext uri="{BB962C8B-B14F-4D97-AF65-F5344CB8AC3E}">
+        <p14:creationId xmlns:p14="http://schemas.microsoft.com/office/powerpoint/2010/main" val="3808481681"/>
+      </p:ext>
+    </p:extLst>
+  </p:cSld>
+  <p:clrMapOvr>
+    <a:masterClrMapping/>
+  </p:clrMapOvr>
+</p:sldLayout>
+</file>
+
+<file path=ppt/slideLayouts/slideLayout11.xml><?xml version="1.0" encoding="utf-8"?>
+<p:sldLayout xmlns:a="http://schemas.openxmlformats.org/drawingml/2006/main" xmlns:r="http://schemas.openxmlformats.org/officeDocument/2006/relationships" xmlns:p="http://schemas.openxmlformats.org/presentationml/2006/main" preserve="1">
+  <p:cSld name="Quote with Caption">
+    <p:spTree>
+      <p:nvGrpSpPr>
+        <p:cNvPr id="1" name=""/>
+        <p:cNvGrpSpPr/>
+        <p:nvPr/>
+      </p:nvGrpSpPr>
+      <p:grpSpPr>
+        <a:xfrm>
+          <a:off x="0" y="0"/>
+          <a:ext cx="0" cy="0"/>
+          <a:chOff x="0" y="0"/>
+          <a:chExt cx="0" cy="0"/>
+        </a:xfrm>
+      </p:grpSpPr>
+      <p:sp>
+        <p:nvSpPr>
+          <p:cNvPr id="2" name="Title 1"/>
+          <p:cNvSpPr>
+            <a:spLocks noGrp="1"/>
+          </p:cNvSpPr>
+          <p:nvPr>
+            <p:ph type="title"/>
+          </p:nvPr>
+        </p:nvSpPr>
+        <p:spPr>
+          <a:xfrm>
+            <a:off x="931334" y="609600"/>
+            <a:ext cx="8094134" cy="3022600"/>
+          </a:xfrm>
+        </p:spPr>
+        <p:txBody>
+          <a:bodyPr anchor="ctr">
+            <a:normAutofit/>
+          </a:bodyPr>
+          <a:lstStyle>
+            <a:lvl1pPr algn="l">
+              <a:defRPr sz="4400" b="0" cap="none"/>
+            </a:lvl1pPr>
+          </a:lstStyle>
+          <a:p>
+            <a:r>
+              <a:rPr lang="en-US" smtClean="0"/>
+              <a:t>Click to edit Master title style</a:t>
+            </a:r>
+            <a:endParaRPr lang="en-US" dirty="0"/>
+          </a:p>
+        </p:txBody>
+      </p:sp>
+      <p:sp>
+        <p:nvSpPr>
+          <p:cNvPr id="23" name="Text Placeholder 9"/>
+          <p:cNvSpPr>
+            <a:spLocks noGrp="1"/>
+          </p:cNvSpPr>
+          <p:nvPr>
+            <p:ph type="body" sz="quarter" idx="13"/>
+          </p:nvPr>
+        </p:nvSpPr>
+        <p:spPr>
+          <a:xfrm>
+            <a:off x="1366139" y="3632200"/>
+            <a:ext cx="7224524" cy="381000"/>
+          </a:xfrm>
+        </p:spPr>
+        <p:txBody>
+          <a:bodyPr anchor="ctr">
+            <a:noAutofit/>
+          </a:bodyPr>
+          <a:lstStyle>
+            <a:lvl1pPr marL="0" indent="0">
+              <a:buFontTx/>
+              <a:buNone/>
+              <a:defRPr sz="1600">
+                <a:solidFill>
+                  <a:schemeClr val="tx1">
+                    <a:lumMod val="50000"/>
+                    <a:lumOff val="50000"/>
+                  </a:schemeClr>
+                </a:solidFill>
+              </a:defRPr>
+            </a:lvl1pPr>
+            <a:lvl2pPr marL="457200" indent="0">
+              <a:buFontTx/>
+              <a:buNone/>
+              <a:defRPr/>
+            </a:lvl2pPr>
+            <a:lvl3pPr marL="914400" indent="0">
+              <a:buFontTx/>
+              <a:buNone/>
+              <a:defRPr/>
+            </a:lvl3pPr>
+            <a:lvl4pPr marL="1371600" indent="0">
+              <a:buFontTx/>
+              <a:buNone/>
+              <a:defRPr/>
+            </a:lvl4pPr>
+            <a:lvl5pPr marL="1828800" indent="0">
+              <a:buFontTx/>
+              <a:buNone/>
+              <a:defRPr/>
+            </a:lvl5pPr>
+          </a:lstStyle>
+          <a:p>
+            <a:pPr lvl="0"/>
+            <a:r>
+              <a:rPr lang="en-US" smtClean="0"/>
+              <a:t>Edit Master text styles</a:t>
+            </a:r>
+          </a:p>
+        </p:txBody>
+      </p:sp>
+      <p:sp>
+        <p:nvSpPr>
+          <p:cNvPr id="3" name="Text Placeholder 2"/>
+          <p:cNvSpPr>
+            <a:spLocks noGrp="1"/>
+          </p:cNvSpPr>
+          <p:nvPr>
+            <p:ph type="body" idx="1"/>
+          </p:nvPr>
+        </p:nvSpPr>
+        <p:spPr>
+          <a:xfrm>
+            <a:off x="677335" y="4470400"/>
+            <a:ext cx="8596668" cy="1570962"/>
+          </a:xfrm>
+        </p:spPr>
+        <p:txBody>
+          <a:bodyPr anchor="ctr">
+            <a:normAutofit/>
+          </a:bodyPr>
+          <a:lstStyle>
+            <a:lvl1pPr marL="0" indent="0" algn="l">
+              <a:buNone/>
+              <a:defRPr sz="1800">
+                <a:solidFill>
+                  <a:schemeClr val="tx1">
+                    <a:lumMod val="75000"/>
+                    <a:lumOff val="25000"/>
+                  </a:schemeClr>
+                </a:solidFill>
+              </a:defRPr>
+            </a:lvl1pPr>
+            <a:lvl2pPr marL="457200" indent="0">
+              <a:buNone/>
+              <a:defRPr sz="1800">
+                <a:solidFill>
+                  <a:schemeClr val="tx1">
+                    <a:tint val="75000"/>
+                  </a:schemeClr>
+                </a:solidFill>
+              </a:defRPr>
+            </a:lvl2pPr>
+            <a:lvl3pPr marL="914400" indent="0">
+              <a:buNone/>
+              <a:defRPr sz="1600">
+                <a:solidFill>
+                  <a:schemeClr val="tx1">
+                    <a:tint val="75000"/>
+                  </a:schemeClr>
+                </a:solidFill>
+              </a:defRPr>
+            </a:lvl3pPr>
+            <a:lvl4pPr marL="1371600" indent="0">
+              <a:buNone/>
+              <a:defRPr sz="1400">
+                <a:solidFill>
+                  <a:schemeClr val="tx1">
+                    <a:tint val="75000"/>
+                  </a:schemeClr>
+                </a:solidFill>
+              </a:defRPr>
+            </a:lvl4pPr>
+            <a:lvl5pPr marL="1828800" indent="0">
+              <a:buNone/>
+              <a:defRPr sz="1400">
+                <a:solidFill>
+                  <a:schemeClr val="tx1">
+                    <a:tint val="75000"/>
+                  </a:schemeClr>
+                </a:solidFill>
+              </a:defRPr>
+            </a:lvl5pPr>
+            <a:lvl6pPr marL="2286000" indent="0">
+              <a:buNone/>
+              <a:defRPr sz="1400">
+                <a:solidFill>
+                  <a:schemeClr val="tx1">
+                    <a:tint val="75000"/>
+                  </a:schemeClr>
+                </a:solidFill>
+              </a:defRPr>
+            </a:lvl6pPr>
+            <a:lvl7pPr marL="2743200" indent="0">
+              <a:buNone/>
+              <a:defRPr sz="1400">
+                <a:solidFill>
+                  <a:schemeClr val="tx1">
+                    <a:tint val="75000"/>
+                  </a:schemeClr>
+                </a:solidFill>
+              </a:defRPr>
+            </a:lvl7pPr>
+            <a:lvl8pPr marL="3200400" indent="0">
+              <a:buNone/>
+              <a:defRPr sz="1400">
+                <a:solidFill>
+                  <a:schemeClr val="tx1">
+                    <a:tint val="75000"/>
+                  </a:schemeClr>
+                </a:solidFill>
+              </a:defRPr>
+            </a:lvl8pPr>
+            <a:lvl9pPr marL="3657600" indent="0">
+              <a:buNone/>
+              <a:defRPr sz="1400">
+                <a:solidFill>
+                  <a:schemeClr val="tx1">
+                    <a:tint val="75000"/>
+                  </a:schemeClr>
+                </a:solidFill>
+              </a:defRPr>
+            </a:lvl9pPr>
+          </a:lstStyle>
+          <a:p>
+            <a:pPr lvl="0"/>
+            <a:r>
+              <a:rPr lang="en-US" smtClean="0"/>
+              <a:t>Edit Master text styles</a:t>
+            </a:r>
+          </a:p>
+        </p:txBody>
+      </p:sp>
+      <p:sp>
+        <p:nvSpPr>
+          <p:cNvPr id="4" name="Date Placeholder 3"/>
+          <p:cNvSpPr>
+            <a:spLocks noGrp="1"/>
+          </p:cNvSpPr>
+          <p:nvPr>
+            <p:ph type="dt" sz="half" idx="10"/>
+          </p:nvPr>
+        </p:nvSpPr>
+        <p:spPr/>
+        <p:txBody>
+          <a:bodyPr/>
+          <a:lstStyle/>
+          <a:p>
+            <a:fld id="{CC087BCE-F3E1-4AF0-BC5A-1334C9720243}" type="datetimeFigureOut">
+              <a:rPr lang="en-US" smtClean="0"/>
+              <a:t>5/27/2020</a:t>
+            </a:fld>
+            <a:endParaRPr lang="en-US"/>
+          </a:p>
+        </p:txBody>
+      </p:sp>
+      <p:sp>
+        <p:nvSpPr>
+          <p:cNvPr id="5" name="Footer Placeholder 4"/>
+          <p:cNvSpPr>
+            <a:spLocks noGrp="1"/>
+          </p:cNvSpPr>
+          <p:nvPr>
+            <p:ph type="ftr" sz="quarter" idx="11"/>
+          </p:nvPr>
+        </p:nvSpPr>
+        <p:spPr/>
+        <p:txBody>
+          <a:bodyPr/>
+          <a:lstStyle/>
+          <a:p>
+            <a:endParaRPr lang="en-US"/>
+          </a:p>
+        </p:txBody>
+      </p:sp>
+      <p:sp>
+        <p:nvSpPr>
+          <p:cNvPr id="6" name="Slide Number Placeholder 5"/>
+          <p:cNvSpPr>
+            <a:spLocks noGrp="1"/>
+          </p:cNvSpPr>
+          <p:nvPr>
+            <p:ph type="sldNum" sz="quarter" idx="12"/>
+          </p:nvPr>
+        </p:nvSpPr>
+        <p:spPr/>
+        <p:txBody>
+          <a:bodyPr/>
+          <a:lstStyle/>
+          <a:p>
+            <a:fld id="{2F97D728-71DB-4E74-8014-C86D43ABD4F9}" type="slidenum">
+              <a:rPr lang="en-US" smtClean="0"/>
+              <a:t>‹#›</a:t>
+            </a:fld>
+            <a:endParaRPr lang="en-US"/>
+          </a:p>
+        </p:txBody>
+      </p:sp>
+      <p:sp>
+        <p:nvSpPr>
+          <p:cNvPr id="20" name="TextBox 19"/>
+          <p:cNvSpPr txBox="1"/>
+          <p:nvPr/>
+        </p:nvSpPr>
+        <p:spPr>
+          <a:xfrm>
+            <a:off x="541870" y="790378"/>
+            <a:ext cx="609600" cy="584776"/>
+          </a:xfrm>
+          <a:prstGeom prst="rect">
+            <a:avLst/>
+          </a:prstGeom>
+        </p:spPr>
+        <p:txBody>
+          <a:bodyPr vert="horz" lIns="91440" tIns="45720" rIns="91440" bIns="45720" rtlCol="0" anchor="ctr">
+            <a:noAutofit/>
+          </a:bodyPr>
+          <a:lstStyle/>
+          <a:p>
+            <a:pPr lvl="0"/>
+            <a:r>
+              <a:rPr lang="en-US" sz="8000" baseline="0" dirty="0">
+                <a:ln w="3175" cmpd="sng">
+                  <a:noFill/>
+                </a:ln>
+                <a:solidFill>
+                  <a:schemeClr val="accent1">
+                    <a:lumMod val="60000"/>
+                    <a:lumOff val="40000"/>
+                  </a:schemeClr>
+                </a:solidFill>
+                <a:effectLst/>
+                <a:latin typeface="Arial"/>
+              </a:rPr>
+              <a:t>“</a:t>
+            </a:r>
+          </a:p>
+        </p:txBody>
+      </p:sp>
+      <p:sp>
+        <p:nvSpPr>
+          <p:cNvPr id="22" name="TextBox 21"/>
+          <p:cNvSpPr txBox="1"/>
+          <p:nvPr/>
+        </p:nvSpPr>
+        <p:spPr>
+          <a:xfrm>
+            <a:off x="8893011" y="2886556"/>
+            <a:ext cx="609600" cy="584776"/>
+          </a:xfrm>
+          <a:prstGeom prst="rect">
+            <a:avLst/>
+          </a:prstGeom>
+        </p:spPr>
+        <p:txBody>
+          <a:bodyPr vert="horz" lIns="91440" tIns="45720" rIns="91440" bIns="45720" rtlCol="0" anchor="ctr">
+            <a:noAutofit/>
+          </a:bodyPr>
+          <a:lstStyle/>
+          <a:p>
+            <a:pPr lvl="0"/>
+            <a:r>
+              <a:rPr lang="en-US" sz="8000" baseline="0" dirty="0">
+                <a:ln w="3175" cmpd="sng">
+                  <a:noFill/>
+                </a:ln>
+                <a:solidFill>
+                  <a:schemeClr val="accent1">
+                    <a:lumMod val="60000"/>
+                    <a:lumOff val="40000"/>
+                  </a:schemeClr>
+                </a:solidFill>
+                <a:latin typeface="Arial"/>
+              </a:rPr>
+              <a:t>”</a:t>
+            </a:r>
+            <a:endParaRPr lang="en-US" dirty="0">
+              <a:solidFill>
+                <a:schemeClr val="accent1">
+                  <a:lumMod val="60000"/>
+                  <a:lumOff val="40000"/>
+                </a:schemeClr>
+              </a:solidFill>
+              <a:latin typeface="Arial"/>
+            </a:endParaRPr>
+          </a:p>
+        </p:txBody>
+      </p:sp>
+    </p:spTree>
+    <p:extLst>
+      <p:ext uri="{BB962C8B-B14F-4D97-AF65-F5344CB8AC3E}">
+        <p14:creationId xmlns:p14="http://schemas.microsoft.com/office/powerpoint/2010/main" val="1218114940"/>
+      </p:ext>
+    </p:extLst>
+  </p:cSld>
+  <p:clrMapOvr>
+    <a:masterClrMapping/>
+  </p:clrMapOvr>
+</p:sldLayout>
+</file>
+
+<file path=ppt/slideLayouts/slideLayout12.xml><?xml version="1.0" encoding="utf-8"?>
+<p:sldLayout xmlns:a="http://schemas.openxmlformats.org/drawingml/2006/main" xmlns:r="http://schemas.openxmlformats.org/officeDocument/2006/relationships" xmlns:p="http://schemas.openxmlformats.org/presentationml/2006/main" preserve="1">
+  <p:cSld name="Name Card">
+    <p:spTree>
+      <p:nvGrpSpPr>
+        <p:cNvPr id="1" name=""/>
+        <p:cNvGrpSpPr/>
+        <p:nvPr/>
+      </p:nvGrpSpPr>
+      <p:grpSpPr>
+        <a:xfrm>
+          <a:off x="0" y="0"/>
+          <a:ext cx="0" cy="0"/>
+          <a:chOff x="0" y="0"/>
+          <a:chExt cx="0" cy="0"/>
+        </a:xfrm>
+      </p:grpSpPr>
+      <p:sp>
+        <p:nvSpPr>
+          <p:cNvPr id="2" name="Title 1"/>
+          <p:cNvSpPr>
+            <a:spLocks noGrp="1"/>
+          </p:cNvSpPr>
+          <p:nvPr>
+            <p:ph type="title"/>
+          </p:nvPr>
+        </p:nvSpPr>
+        <p:spPr>
+          <a:xfrm>
+            <a:off x="677335" y="1931988"/>
+            <a:ext cx="8596668" cy="2595460"/>
+          </a:xfrm>
+        </p:spPr>
+        <p:txBody>
+          <a:bodyPr anchor="b">
+            <a:normAutofit/>
+          </a:bodyPr>
+          <a:lstStyle>
+            <a:lvl1pPr algn="l">
+              <a:defRPr sz="4400" b="0" cap="none"/>
+            </a:lvl1pPr>
+          </a:lstStyle>
+          <a:p>
+            <a:r>
+              <a:rPr lang="en-US" smtClean="0"/>
+              <a:t>Click to edit Master title style</a:t>
+            </a:r>
+            <a:endParaRPr lang="en-US" dirty="0"/>
+          </a:p>
+        </p:txBody>
+      </p:sp>
+      <p:sp>
+        <p:nvSpPr>
+          <p:cNvPr id="3" name="Text Placeholder 2"/>
+          <p:cNvSpPr>
+            <a:spLocks noGrp="1"/>
+          </p:cNvSpPr>
+          <p:nvPr>
+            <p:ph type="body" idx="1"/>
+          </p:nvPr>
+        </p:nvSpPr>
+        <p:spPr>
+          <a:xfrm>
+            <a:off x="677335" y="4527448"/>
+            <a:ext cx="8596668" cy="1513914"/>
+          </a:xfrm>
+        </p:spPr>
+        <p:txBody>
+          <a:bodyPr anchor="t">
+            <a:normAutofit/>
+          </a:bodyPr>
+          <a:lstStyle>
+            <a:lvl1pPr marL="0" indent="0" algn="l">
+              <a:buNone/>
+              <a:defRPr sz="1800">
+                <a:solidFill>
+                  <a:schemeClr val="tx1">
+                    <a:lumMod val="75000"/>
+                    <a:lumOff val="25000"/>
+                  </a:schemeClr>
+                </a:solidFill>
+              </a:defRPr>
+            </a:lvl1pPr>
+            <a:lvl2pPr marL="457200" indent="0">
+              <a:buNone/>
+              <a:defRPr sz="1800">
+                <a:solidFill>
+                  <a:schemeClr val="tx1">
+                    <a:tint val="75000"/>
+                  </a:schemeClr>
+                </a:solidFill>
+              </a:defRPr>
+            </a:lvl2pPr>
+            <a:lvl3pPr marL="914400" indent="0">
+              <a:buNone/>
+              <a:defRPr sz="1600">
+                <a:solidFill>
+                  <a:schemeClr val="tx1">
+                    <a:tint val="75000"/>
+                  </a:schemeClr>
+                </a:solidFill>
+              </a:defRPr>
+            </a:lvl3pPr>
+            <a:lvl4pPr marL="1371600" indent="0">
+              <a:buNone/>
+              <a:defRPr sz="1400">
+                <a:solidFill>
+                  <a:schemeClr val="tx1">
+                    <a:tint val="75000"/>
+                  </a:schemeClr>
+                </a:solidFill>
+              </a:defRPr>
+            </a:lvl4pPr>
+            <a:lvl5pPr marL="1828800" indent="0">
+              <a:buNone/>
+              <a:defRPr sz="1400">
+                <a:solidFill>
+                  <a:schemeClr val="tx1">
+                    <a:tint val="75000"/>
+                  </a:schemeClr>
+                </a:solidFill>
+              </a:defRPr>
+            </a:lvl5pPr>
+            <a:lvl6pPr marL="2286000" indent="0">
+              <a:buNone/>
+              <a:defRPr sz="1400">
+                <a:solidFill>
+                  <a:schemeClr val="tx1">
+                    <a:tint val="75000"/>
+                  </a:schemeClr>
+                </a:solidFill>
+              </a:defRPr>
+            </a:lvl6pPr>
+            <a:lvl7pPr marL="2743200" indent="0">
+              <a:buNone/>
+              <a:defRPr sz="1400">
+                <a:solidFill>
+                  <a:schemeClr val="tx1">
+                    <a:tint val="75000"/>
+                  </a:schemeClr>
+                </a:solidFill>
+              </a:defRPr>
+            </a:lvl7pPr>
+            <a:lvl8pPr marL="3200400" indent="0">
+              <a:buNone/>
+              <a:defRPr sz="1400">
+                <a:solidFill>
+                  <a:schemeClr val="tx1">
+                    <a:tint val="75000"/>
+                  </a:schemeClr>
+                </a:solidFill>
+              </a:defRPr>
+            </a:lvl8pPr>
+            <a:lvl9pPr marL="3657600" indent="0">
+              <a:buNone/>
+              <a:defRPr sz="1400">
+                <a:solidFill>
+                  <a:schemeClr val="tx1">
+                    <a:tint val="75000"/>
+                  </a:schemeClr>
+                </a:solidFill>
+              </a:defRPr>
+            </a:lvl9pPr>
+          </a:lstStyle>
+          <a:p>
+            <a:pPr lvl="0"/>
+            <a:r>
+              <a:rPr lang="en-US" smtClean="0"/>
+              <a:t>Edit Master text styles</a:t>
+            </a:r>
+          </a:p>
+        </p:txBody>
+      </p:sp>
+      <p:sp>
+        <p:nvSpPr>
+          <p:cNvPr id="4" name="Date Placeholder 3"/>
+          <p:cNvSpPr>
+            <a:spLocks noGrp="1"/>
+          </p:cNvSpPr>
+          <p:nvPr>
+            <p:ph type="dt" sz="half" idx="10"/>
+          </p:nvPr>
+        </p:nvSpPr>
+        <p:spPr/>
+        <p:txBody>
+          <a:bodyPr/>
+          <a:lstStyle/>
+          <a:p>
+            <a:fld id="{CC087BCE-F3E1-4AF0-BC5A-1334C9720243}" type="datetimeFigureOut">
+              <a:rPr lang="en-US" smtClean="0"/>
+              <a:t>5/27/2020</a:t>
+            </a:fld>
+            <a:endParaRPr lang="en-US"/>
+          </a:p>
+        </p:txBody>
+      </p:sp>
+      <p:sp>
+        <p:nvSpPr>
+          <p:cNvPr id="5" name="Footer Placeholder 4"/>
+          <p:cNvSpPr>
+            <a:spLocks noGrp="1"/>
+          </p:cNvSpPr>
+          <p:nvPr>
+            <p:ph type="ftr" sz="quarter" idx="11"/>
+          </p:nvPr>
+        </p:nvSpPr>
+        <p:spPr/>
+        <p:txBody>
+          <a:bodyPr/>
+          <a:lstStyle/>
+          <a:p>
+            <a:endParaRPr lang="en-US"/>
+          </a:p>
+        </p:txBody>
+      </p:sp>
+      <p:sp>
+        <p:nvSpPr>
+          <p:cNvPr id="6" name="Slide Number Placeholder 5"/>
+          <p:cNvSpPr>
+            <a:spLocks noGrp="1"/>
+          </p:cNvSpPr>
+          <p:nvPr>
+            <p:ph type="sldNum" sz="quarter" idx="12"/>
+          </p:nvPr>
+        </p:nvSpPr>
+        <p:spPr/>
+        <p:txBody>
+          <a:bodyPr/>
+          <a:lstStyle/>
+          <a:p>
+            <a:fld id="{2F97D728-71DB-4E74-8014-C86D43ABD4F9}" type="slidenum">
+              <a:rPr lang="en-US" smtClean="0"/>
+              <a:t>‹#›</a:t>
+            </a:fld>
+            <a:endParaRPr lang="en-US"/>
+          </a:p>
+        </p:txBody>
+      </p:sp>
+    </p:spTree>
+    <p:extLst>
+      <p:ext uri="{BB962C8B-B14F-4D97-AF65-F5344CB8AC3E}">
+        <p14:creationId xmlns:p14="http://schemas.microsoft.com/office/powerpoint/2010/main" val="3731198555"/>
+      </p:ext>
+    </p:extLst>
+  </p:cSld>
+  <p:clrMapOvr>
+    <a:masterClrMapping/>
+  </p:clrMapOvr>
+</p:sldLayout>
+</file>
+
+<file path=ppt/slideLayouts/slideLayout13.xml><?xml version="1.0" encoding="utf-8"?>
+<p:sldLayout xmlns:a="http://schemas.openxmlformats.org/drawingml/2006/main" xmlns:r="http://schemas.openxmlformats.org/officeDocument/2006/relationships" xmlns:p="http://schemas.openxmlformats.org/presentationml/2006/main" preserve="1">
+  <p:cSld name="Quote Name Card">
+    <p:spTree>
+      <p:nvGrpSpPr>
+        <p:cNvPr id="1" name=""/>
+        <p:cNvGrpSpPr/>
+        <p:nvPr/>
+      </p:nvGrpSpPr>
+      <p:grpSpPr>
+        <a:xfrm>
+          <a:off x="0" y="0"/>
+          <a:ext cx="0" cy="0"/>
+          <a:chOff x="0" y="0"/>
+          <a:chExt cx="0" cy="0"/>
+        </a:xfrm>
+      </p:grpSpPr>
+      <p:sp>
+        <p:nvSpPr>
+          <p:cNvPr id="2" name="Title 1"/>
+          <p:cNvSpPr>
+            <a:spLocks noGrp="1"/>
+          </p:cNvSpPr>
+          <p:nvPr>
+            <p:ph type="title"/>
+          </p:nvPr>
+        </p:nvSpPr>
+        <p:spPr>
+          <a:xfrm>
+            <a:off x="931334" y="609600"/>
+            <a:ext cx="8094134" cy="3022600"/>
+          </a:xfrm>
+        </p:spPr>
+        <p:txBody>
+          <a:bodyPr anchor="ctr">
+            <a:normAutofit/>
+          </a:bodyPr>
+          <a:lstStyle>
+            <a:lvl1pPr algn="l">
+              <a:defRPr sz="4400" b="0" cap="none"/>
+            </a:lvl1pPr>
+          </a:lstStyle>
+          <a:p>
+            <a:r>
+              <a:rPr lang="en-US" smtClean="0"/>
+              <a:t>Click to edit Master title style</a:t>
+            </a:r>
+            <a:endParaRPr lang="en-US" dirty="0"/>
+          </a:p>
+        </p:txBody>
+      </p:sp>
+      <p:sp>
+        <p:nvSpPr>
+          <p:cNvPr id="23" name="Text Placeholder 9"/>
+          <p:cNvSpPr>
+            <a:spLocks noGrp="1"/>
+          </p:cNvSpPr>
+          <p:nvPr>
+            <p:ph type="body" sz="quarter" idx="13"/>
+          </p:nvPr>
+        </p:nvSpPr>
+        <p:spPr>
+          <a:xfrm>
+            <a:off x="677332" y="4013200"/>
+            <a:ext cx="8596669" cy="514248"/>
+          </a:xfrm>
+        </p:spPr>
+        <p:txBody>
+          <a:bodyPr anchor="b">
+            <a:noAutofit/>
+          </a:bodyPr>
+          <a:lstStyle>
+            <a:lvl1pPr marL="0" indent="0">
+              <a:buFontTx/>
+              <a:buNone/>
+              <a:defRPr sz="2400">
+                <a:solidFill>
+                  <a:schemeClr val="tx1">
+                    <a:lumMod val="75000"/>
+                    <a:lumOff val="25000"/>
+                  </a:schemeClr>
+                </a:solidFill>
+              </a:defRPr>
+            </a:lvl1pPr>
+            <a:lvl2pPr marL="457200" indent="0">
+              <a:buFontTx/>
+              <a:buNone/>
+              <a:defRPr/>
+            </a:lvl2pPr>
+            <a:lvl3pPr marL="914400" indent="0">
+              <a:buFontTx/>
+              <a:buNone/>
+              <a:defRPr/>
+            </a:lvl3pPr>
+            <a:lvl4pPr marL="1371600" indent="0">
+              <a:buFontTx/>
+              <a:buNone/>
+              <a:defRPr/>
+            </a:lvl4pPr>
+            <a:lvl5pPr marL="1828800" indent="0">
+              <a:buFontTx/>
+              <a:buNone/>
+              <a:defRPr/>
+            </a:lvl5pPr>
+          </a:lstStyle>
+          <a:p>
+            <a:pPr lvl="0"/>
+            <a:r>
+              <a:rPr lang="en-US" smtClean="0"/>
+              <a:t>Edit Master text styles</a:t>
+            </a:r>
+          </a:p>
+        </p:txBody>
+      </p:sp>
+      <p:sp>
+        <p:nvSpPr>
+          <p:cNvPr id="3" name="Text Placeholder 2"/>
+          <p:cNvSpPr>
+            <a:spLocks noGrp="1"/>
+          </p:cNvSpPr>
+          <p:nvPr>
+            <p:ph type="body" idx="1"/>
+          </p:nvPr>
+        </p:nvSpPr>
+        <p:spPr>
+          <a:xfrm>
+            <a:off x="677335" y="4527448"/>
+            <a:ext cx="8596668" cy="1513914"/>
+          </a:xfrm>
+        </p:spPr>
+        <p:txBody>
+          <a:bodyPr anchor="t">
+            <a:normAutofit/>
+          </a:bodyPr>
+          <a:lstStyle>
+            <a:lvl1pPr marL="0" indent="0" algn="l">
+              <a:buNone/>
+              <a:defRPr sz="1800">
+                <a:solidFill>
+                  <a:schemeClr val="tx1">
+                    <a:lumMod val="50000"/>
+                    <a:lumOff val="50000"/>
+                  </a:schemeClr>
+                </a:solidFill>
+              </a:defRPr>
+            </a:lvl1pPr>
+            <a:lvl2pPr marL="457200" indent="0">
+              <a:buNone/>
+              <a:defRPr sz="1800">
+                <a:solidFill>
+                  <a:schemeClr val="tx1">
+                    <a:tint val="75000"/>
+                  </a:schemeClr>
+                </a:solidFill>
+              </a:defRPr>
+            </a:lvl2pPr>
+            <a:lvl3pPr marL="914400" indent="0">
+              <a:buNone/>
+              <a:defRPr sz="1600">
+                <a:solidFill>
+                  <a:schemeClr val="tx1">
+                    <a:tint val="75000"/>
+                  </a:schemeClr>
+                </a:solidFill>
+              </a:defRPr>
+            </a:lvl3pPr>
+            <a:lvl4pPr marL="1371600" indent="0">
+              <a:buNone/>
+              <a:defRPr sz="1400">
+                <a:solidFill>
+                  <a:schemeClr val="tx1">
+                    <a:tint val="75000"/>
+                  </a:schemeClr>
+                </a:solidFill>
+              </a:defRPr>
+            </a:lvl4pPr>
+            <a:lvl5pPr marL="1828800" indent="0">
+              <a:buNone/>
+              <a:defRPr sz="1400">
+                <a:solidFill>
+                  <a:schemeClr val="tx1">
+                    <a:tint val="75000"/>
+                  </a:schemeClr>
+                </a:solidFill>
+              </a:defRPr>
+            </a:lvl5pPr>
+            <a:lvl6pPr marL="2286000" indent="0">
+              <a:buNone/>
+              <a:defRPr sz="1400">
+                <a:solidFill>
+                  <a:schemeClr val="tx1">
+                    <a:tint val="75000"/>
+                  </a:schemeClr>
+                </a:solidFill>
+              </a:defRPr>
+            </a:lvl6pPr>
+            <a:lvl7pPr marL="2743200" indent="0">
+              <a:buNone/>
+              <a:defRPr sz="1400">
+                <a:solidFill>
+                  <a:schemeClr val="tx1">
+                    <a:tint val="75000"/>
+                  </a:schemeClr>
+                </a:solidFill>
+              </a:defRPr>
+            </a:lvl7pPr>
+            <a:lvl8pPr marL="3200400" indent="0">
+              <a:buNone/>
+              <a:defRPr sz="1400">
+                <a:solidFill>
+                  <a:schemeClr val="tx1">
+                    <a:tint val="75000"/>
+                  </a:schemeClr>
+                </a:solidFill>
+              </a:defRPr>
+            </a:lvl8pPr>
+            <a:lvl9pPr marL="3657600" indent="0">
+              <a:buNone/>
+              <a:defRPr sz="1400">
+                <a:solidFill>
+                  <a:schemeClr val="tx1">
+                    <a:tint val="75000"/>
+                  </a:schemeClr>
+                </a:solidFill>
+              </a:defRPr>
+            </a:lvl9pPr>
+          </a:lstStyle>
+          <a:p>
+            <a:pPr lvl="0"/>
+            <a:r>
+              <a:rPr lang="en-US" smtClean="0"/>
+              <a:t>Edit Master text styles</a:t>
+            </a:r>
+          </a:p>
+        </p:txBody>
+      </p:sp>
+      <p:sp>
+        <p:nvSpPr>
+          <p:cNvPr id="4" name="Date Placeholder 3"/>
+          <p:cNvSpPr>
+            <a:spLocks noGrp="1"/>
+          </p:cNvSpPr>
+          <p:nvPr>
+            <p:ph type="dt" sz="half" idx="10"/>
+          </p:nvPr>
+        </p:nvSpPr>
+        <p:spPr/>
+        <p:txBody>
+          <a:bodyPr/>
+          <a:lstStyle/>
+          <a:p>
+            <a:fld id="{CC087BCE-F3E1-4AF0-BC5A-1334C9720243}" type="datetimeFigureOut">
+              <a:rPr lang="en-US" smtClean="0"/>
+              <a:t>5/27/2020</a:t>
+            </a:fld>
+            <a:endParaRPr lang="en-US"/>
+          </a:p>
+        </p:txBody>
+      </p:sp>
+      <p:sp>
+        <p:nvSpPr>
+          <p:cNvPr id="5" name="Footer Placeholder 4"/>
+          <p:cNvSpPr>
+            <a:spLocks noGrp="1"/>
+          </p:cNvSpPr>
+          <p:nvPr>
+            <p:ph type="ftr" sz="quarter" idx="11"/>
+          </p:nvPr>
+        </p:nvSpPr>
+        <p:spPr/>
+        <p:txBody>
+          <a:bodyPr/>
+          <a:lstStyle/>
+          <a:p>
+            <a:endParaRPr lang="en-US"/>
+          </a:p>
+        </p:txBody>
+      </p:sp>
+      <p:sp>
+        <p:nvSpPr>
+          <p:cNvPr id="6" name="Slide Number Placeholder 5"/>
+          <p:cNvSpPr>
+            <a:spLocks noGrp="1"/>
+          </p:cNvSpPr>
+          <p:nvPr>
+            <p:ph type="sldNum" sz="quarter" idx="12"/>
+          </p:nvPr>
+        </p:nvSpPr>
+        <p:spPr/>
+        <p:txBody>
+          <a:bodyPr/>
+          <a:lstStyle/>
+          <a:p>
+            <a:fld id="{2F97D728-71DB-4E74-8014-C86D43ABD4F9}" type="slidenum">
+              <a:rPr lang="en-US" smtClean="0"/>
+              <a:t>‹#›</a:t>
+            </a:fld>
+            <a:endParaRPr lang="en-US"/>
+          </a:p>
+        </p:txBody>
+      </p:sp>
+      <p:sp>
+        <p:nvSpPr>
+          <p:cNvPr id="24" name="TextBox 23"/>
+          <p:cNvSpPr txBox="1"/>
+          <p:nvPr/>
+        </p:nvSpPr>
+        <p:spPr>
+          <a:xfrm>
+            <a:off x="541870" y="790378"/>
+            <a:ext cx="609600" cy="584776"/>
+          </a:xfrm>
+          <a:prstGeom prst="rect">
+            <a:avLst/>
+          </a:prstGeom>
+        </p:spPr>
+        <p:txBody>
+          <a:bodyPr vert="horz" lIns="91440" tIns="45720" rIns="91440" bIns="45720" rtlCol="0" anchor="ctr">
+            <a:noAutofit/>
+          </a:bodyPr>
+          <a:lstStyle/>
+          <a:p>
+            <a:pPr lvl="0"/>
+            <a:r>
+              <a:rPr lang="en-US" sz="8000" baseline="0" dirty="0">
+                <a:ln w="3175" cmpd="sng">
+                  <a:noFill/>
+                </a:ln>
+                <a:solidFill>
+                  <a:schemeClr val="accent1">
+                    <a:lumMod val="60000"/>
+                    <a:lumOff val="40000"/>
+                  </a:schemeClr>
+                </a:solidFill>
+                <a:effectLst/>
+                <a:latin typeface="Arial"/>
+              </a:rPr>
+              <a:t>“</a:t>
+            </a:r>
+          </a:p>
+        </p:txBody>
+      </p:sp>
+      <p:sp>
+        <p:nvSpPr>
+          <p:cNvPr id="25" name="TextBox 24"/>
+          <p:cNvSpPr txBox="1"/>
+          <p:nvPr/>
+        </p:nvSpPr>
+        <p:spPr>
+          <a:xfrm>
+            <a:off x="8893011" y="2886556"/>
+            <a:ext cx="609600" cy="584776"/>
+          </a:xfrm>
+          <a:prstGeom prst="rect">
+            <a:avLst/>
+          </a:prstGeom>
+        </p:spPr>
+        <p:txBody>
+          <a:bodyPr vert="horz" lIns="91440" tIns="45720" rIns="91440" bIns="45720" rtlCol="0" anchor="ctr">
+            <a:noAutofit/>
+          </a:bodyPr>
+          <a:lstStyle/>
+          <a:p>
+            <a:pPr lvl="0"/>
+            <a:r>
+              <a:rPr lang="en-US" sz="8000" baseline="0" dirty="0">
+                <a:ln w="3175" cmpd="sng">
+                  <a:noFill/>
+                </a:ln>
+                <a:solidFill>
+                  <a:schemeClr val="accent1">
+                    <a:lumMod val="60000"/>
+                    <a:lumOff val="40000"/>
+                  </a:schemeClr>
+                </a:solidFill>
+                <a:effectLst/>
+                <a:latin typeface="Arial"/>
+              </a:rPr>
+              <a:t>”</a:t>
+            </a:r>
+          </a:p>
+        </p:txBody>
+      </p:sp>
+    </p:spTree>
+    <p:extLst>
+      <p:ext uri="{BB962C8B-B14F-4D97-AF65-F5344CB8AC3E}">
+        <p14:creationId xmlns:p14="http://schemas.microsoft.com/office/powerpoint/2010/main" val="188946344"/>
+      </p:ext>
+    </p:extLst>
+  </p:cSld>
+  <p:clrMapOvr>
+    <a:masterClrMapping/>
+  </p:clrMapOvr>
+</p:sldLayout>
+</file>
+
+<file path=ppt/slideLayouts/slideLayout14.xml><?xml version="1.0" encoding="utf-8"?>
+<p:sldLayout xmlns:a="http://schemas.openxmlformats.org/drawingml/2006/main" xmlns:r="http://schemas.openxmlformats.org/officeDocument/2006/relationships" xmlns:p="http://schemas.openxmlformats.org/presentationml/2006/main" preserve="1">
+  <p:cSld name="True or False">
+    <p:spTree>
+      <p:nvGrpSpPr>
+        <p:cNvPr id="1" name=""/>
+        <p:cNvGrpSpPr/>
+        <p:nvPr/>
+      </p:nvGrpSpPr>
+      <p:grpSpPr>
+        <a:xfrm>
+          <a:off x="0" y="0"/>
+          <a:ext cx="0" cy="0"/>
+          <a:chOff x="0" y="0"/>
+          <a:chExt cx="0" cy="0"/>
+        </a:xfrm>
+      </p:grpSpPr>
+      <p:sp>
+        <p:nvSpPr>
+          <p:cNvPr id="2" name="Title 1"/>
+          <p:cNvSpPr>
+            <a:spLocks noGrp="1"/>
+          </p:cNvSpPr>
+          <p:nvPr>
+            <p:ph type="title"/>
+          </p:nvPr>
+        </p:nvSpPr>
+        <p:spPr>
+          <a:xfrm>
+            <a:off x="685799" y="609600"/>
+            <a:ext cx="8588203" cy="3022600"/>
+          </a:xfrm>
+        </p:spPr>
+        <p:txBody>
+          <a:bodyPr anchor="ctr">
+            <a:normAutofit/>
+          </a:bodyPr>
+          <a:lstStyle>
+            <a:lvl1pPr algn="l">
+              <a:defRPr sz="4400" b="0" cap="none"/>
+            </a:lvl1pPr>
+          </a:lstStyle>
+          <a:p>
+            <a:r>
+              <a:rPr lang="en-US" smtClean="0"/>
+              <a:t>Click to edit Master title style</a:t>
+            </a:r>
+            <a:endParaRPr lang="en-US" dirty="0"/>
+          </a:p>
+        </p:txBody>
+      </p:sp>
+      <p:sp>
+        <p:nvSpPr>
+          <p:cNvPr id="23" name="Text Placeholder 9"/>
+          <p:cNvSpPr>
+            <a:spLocks noGrp="1"/>
+          </p:cNvSpPr>
+          <p:nvPr>
+            <p:ph type="body" sz="quarter" idx="13"/>
+          </p:nvPr>
+        </p:nvSpPr>
+        <p:spPr>
+          <a:xfrm>
+            <a:off x="677332" y="4013200"/>
+            <a:ext cx="8596669" cy="514248"/>
+          </a:xfrm>
+        </p:spPr>
+        <p:txBody>
+          <a:bodyPr anchor="b">
+            <a:noAutofit/>
+          </a:bodyPr>
+          <a:lstStyle>
+            <a:lvl1pPr marL="0" indent="0">
+              <a:buFontTx/>
+              <a:buNone/>
+              <a:defRPr sz="2400">
+                <a:solidFill>
+                  <a:schemeClr val="accent1"/>
+                </a:solidFill>
+              </a:defRPr>
+            </a:lvl1pPr>
+            <a:lvl2pPr marL="457200" indent="0">
+              <a:buFontTx/>
+              <a:buNone/>
+              <a:defRPr/>
+            </a:lvl2pPr>
+            <a:lvl3pPr marL="914400" indent="0">
+              <a:buFontTx/>
+              <a:buNone/>
+              <a:defRPr/>
+            </a:lvl3pPr>
+            <a:lvl4pPr marL="1371600" indent="0">
+              <a:buFontTx/>
+              <a:buNone/>
+              <a:defRPr/>
+            </a:lvl4pPr>
+            <a:lvl5pPr marL="1828800" indent="0">
+              <a:buFontTx/>
+              <a:buNone/>
+              <a:defRPr/>
+            </a:lvl5pPr>
+          </a:lstStyle>
+          <a:p>
+            <a:pPr lvl="0"/>
+            <a:r>
+              <a:rPr lang="en-US" smtClean="0"/>
+              <a:t>Edit Master text styles</a:t>
+            </a:r>
+          </a:p>
+        </p:txBody>
+      </p:sp>
+      <p:sp>
+        <p:nvSpPr>
+          <p:cNvPr id="3" name="Text Placeholder 2"/>
+          <p:cNvSpPr>
+            <a:spLocks noGrp="1"/>
+          </p:cNvSpPr>
+          <p:nvPr>
+            <p:ph type="body" idx="1"/>
+          </p:nvPr>
+        </p:nvSpPr>
+        <p:spPr>
+          <a:xfrm>
+            <a:off x="677335" y="4527448"/>
+            <a:ext cx="8596668" cy="1513914"/>
+          </a:xfrm>
+        </p:spPr>
+        <p:txBody>
+          <a:bodyPr anchor="t">
+            <a:normAutofit/>
+          </a:bodyPr>
+          <a:lstStyle>
+            <a:lvl1pPr marL="0" indent="0" algn="l">
+              <a:buNone/>
+              <a:defRPr sz="1800">
+                <a:solidFill>
+                  <a:schemeClr val="tx1">
+                    <a:lumMod val="50000"/>
+                    <a:lumOff val="50000"/>
+                  </a:schemeClr>
+                </a:solidFill>
+              </a:defRPr>
+            </a:lvl1pPr>
+            <a:lvl2pPr marL="457200" indent="0">
+              <a:buNone/>
+              <a:defRPr sz="1800">
+                <a:solidFill>
+                  <a:schemeClr val="tx1">
+                    <a:tint val="75000"/>
+                  </a:schemeClr>
+                </a:solidFill>
+              </a:defRPr>
+            </a:lvl2pPr>
+            <a:lvl3pPr marL="914400" indent="0">
+              <a:buNone/>
+              <a:defRPr sz="1600">
+                <a:solidFill>
+                  <a:schemeClr val="tx1">
+                    <a:tint val="75000"/>
+                  </a:schemeClr>
+                </a:solidFill>
+              </a:defRPr>
+            </a:lvl3pPr>
+            <a:lvl4pPr marL="1371600" indent="0">
+              <a:buNone/>
+              <a:defRPr sz="1400">
+                <a:solidFill>
+                  <a:schemeClr val="tx1">
+                    <a:tint val="75000"/>
+                  </a:schemeClr>
+                </a:solidFill>
+              </a:defRPr>
+            </a:lvl4pPr>
+            <a:lvl5pPr marL="1828800" indent="0">
+              <a:buNone/>
+              <a:defRPr sz="1400">
+                <a:solidFill>
+                  <a:schemeClr val="tx1">
+                    <a:tint val="75000"/>
+                  </a:schemeClr>
+                </a:solidFill>
+              </a:defRPr>
+            </a:lvl5pPr>
+            <a:lvl6pPr marL="2286000" indent="0">
+              <a:buNone/>
+              <a:defRPr sz="1400">
+                <a:solidFill>
+                  <a:schemeClr val="tx1">
+                    <a:tint val="75000"/>
+                  </a:schemeClr>
+                </a:solidFill>
+              </a:defRPr>
+            </a:lvl6pPr>
+            <a:lvl7pPr marL="2743200" indent="0">
+              <a:buNone/>
+              <a:defRPr sz="1400">
+                <a:solidFill>
+                  <a:schemeClr val="tx1">
+                    <a:tint val="75000"/>
+                  </a:schemeClr>
+                </a:solidFill>
+              </a:defRPr>
+            </a:lvl7pPr>
+            <a:lvl8pPr marL="3200400" indent="0">
+              <a:buNone/>
+              <a:defRPr sz="1400">
+                <a:solidFill>
+                  <a:schemeClr val="tx1">
+                    <a:tint val="75000"/>
+                  </a:schemeClr>
+                </a:solidFill>
+              </a:defRPr>
+            </a:lvl8pPr>
+            <a:lvl9pPr marL="3657600" indent="0">
+              <a:buNone/>
+              <a:defRPr sz="1400">
+                <a:solidFill>
+                  <a:schemeClr val="tx1">
+                    <a:tint val="75000"/>
+                  </a:schemeClr>
+                </a:solidFill>
+              </a:defRPr>
+            </a:lvl9pPr>
+          </a:lstStyle>
+          <a:p>
+            <a:pPr lvl="0"/>
+            <a:r>
+              <a:rPr lang="en-US" smtClean="0"/>
+              <a:t>Edit Master text styles</a:t>
+            </a:r>
+          </a:p>
+        </p:txBody>
+      </p:sp>
+      <p:sp>
+        <p:nvSpPr>
+          <p:cNvPr id="4" name="Date Placeholder 3"/>
+          <p:cNvSpPr>
+            <a:spLocks noGrp="1"/>
+          </p:cNvSpPr>
+          <p:nvPr>
+            <p:ph type="dt" sz="half" idx="10"/>
+          </p:nvPr>
+        </p:nvSpPr>
+        <p:spPr/>
+        <p:txBody>
+          <a:bodyPr/>
+          <a:lstStyle/>
+          <a:p>
+            <a:fld id="{CC087BCE-F3E1-4AF0-BC5A-1334C9720243}" type="datetimeFigureOut">
+              <a:rPr lang="en-US" smtClean="0"/>
+              <a:t>5/27/2020</a:t>
+            </a:fld>
+            <a:endParaRPr lang="en-US"/>
+          </a:p>
+        </p:txBody>
+      </p:sp>
+      <p:sp>
+        <p:nvSpPr>
+          <p:cNvPr id="5" name="Footer Placeholder 4"/>
+          <p:cNvSpPr>
+            <a:spLocks noGrp="1"/>
+          </p:cNvSpPr>
+          <p:nvPr>
+            <p:ph type="ftr" sz="quarter" idx="11"/>
+          </p:nvPr>
+        </p:nvSpPr>
+        <p:spPr/>
+        <p:txBody>
+          <a:bodyPr/>
+          <a:lstStyle/>
+          <a:p>
+            <a:endParaRPr lang="en-US"/>
+          </a:p>
+        </p:txBody>
+      </p:sp>
+      <p:sp>
+        <p:nvSpPr>
+          <p:cNvPr id="6" name="Slide Number Placeholder 5"/>
+          <p:cNvSpPr>
+            <a:spLocks noGrp="1"/>
+          </p:cNvSpPr>
+          <p:nvPr>
+            <p:ph type="sldNum" sz="quarter" idx="12"/>
+          </p:nvPr>
+        </p:nvSpPr>
+        <p:spPr/>
+        <p:txBody>
+          <a:bodyPr/>
+          <a:lstStyle/>
+          <a:p>
+            <a:fld id="{2F97D728-71DB-4E74-8014-C86D43ABD4F9}" type="slidenum">
+              <a:rPr lang="en-US" smtClean="0"/>
+              <a:t>‹#›</a:t>
+            </a:fld>
+            <a:endParaRPr lang="en-US"/>
+          </a:p>
+        </p:txBody>
+      </p:sp>
+    </p:spTree>
+    <p:extLst>
+      <p:ext uri="{BB962C8B-B14F-4D97-AF65-F5344CB8AC3E}">
+        <p14:creationId xmlns:p14="http://schemas.microsoft.com/office/powerpoint/2010/main" val="526700293"/>
+      </p:ext>
+    </p:extLst>
+  </p:cSld>
+  <p:clrMapOvr>
+    <a:masterClrMapping/>
+  </p:clrMapOvr>
+</p:sldLayout>
+</file>
+
+<file path=ppt/slideLayouts/slideLayout15.xml><?xml version="1.0" encoding="utf-8"?>
 <p:sldLayout xmlns:a="http://schemas.openxmlformats.org/drawingml/2006/main" xmlns:r="http://schemas.openxmlformats.org/officeDocument/2006/relationships" xmlns:p="http://schemas.openxmlformats.org/presentationml/2006/main" type="vertTx" preserve="1">
   <p:cSld name="Title and Vertical Text">
     <p:spTree>
@@ -347,7 +2556,7 @@
               <a:rPr lang="en-US" smtClean="0"/>
               <a:t>Click to edit Master title style</a:t>
             </a:r>
-            <a:endParaRPr lang="en-US"/>
+            <a:endParaRPr lang="en-US" dirty="0"/>
           </a:p>
         </p:txBody>
       </p:sp>
@@ -399,7 +2608,7 @@
               <a:rPr lang="en-US" smtClean="0"/>
               <a:t>Fifth level</a:t>
             </a:r>
-            <a:endParaRPr lang="en-US"/>
+            <a:endParaRPr lang="en-US" dirty="0"/>
           </a:p>
         </p:txBody>
       </p:sp>
@@ -471,7 +2680,7 @@
     </p:spTree>
     <p:extLst>
       <p:ext uri="{BB962C8B-B14F-4D97-AF65-F5344CB8AC3E}">
-        <p14:creationId xmlns:p14="http://schemas.microsoft.com/office/powerpoint/2010/main" val="3766840665"/>
+        <p14:creationId xmlns:p14="http://schemas.microsoft.com/office/powerpoint/2010/main" val="4046055097"/>
       </p:ext>
     </p:extLst>
   </p:cSld>
@@ -481,7 +2690,7 @@
 </p:sldLayout>
 </file>
 
-<file path=ppt/slideLayouts/slideLayout11.xml><?xml version="1.0" encoding="utf-8"?>
+<file path=ppt/slideLayouts/slideLayout16.xml><?xml version="1.0" encoding="utf-8"?>
 <p:sldLayout xmlns:a="http://schemas.openxmlformats.org/drawingml/2006/main" xmlns:r="http://schemas.openxmlformats.org/officeDocument/2006/relationships" xmlns:p="http://schemas.openxmlformats.org/presentationml/2006/main" type="vertTitleAndTx" preserve="1">
   <p:cSld name="Vertical Title and Text">
     <p:spTree>
@@ -510,42 +2719,42 @@
         </p:nvSpPr>
         <p:spPr>
           <a:xfrm>
-            <a:off x="8724900" y="365125"/>
-            <a:ext cx="2628900" cy="5811838"/>
+            <a:off x="7967673" y="609599"/>
+            <a:ext cx="1304743" cy="5251451"/>
           </a:xfrm>
         </p:spPr>
         <p:txBody>
+          <a:bodyPr vert="eaVert" anchor="ctr"/>
+          <a:lstStyle/>
+          <a:p>
+            <a:r>
+              <a:rPr lang="en-US" smtClean="0"/>
+              <a:t>Click to edit Master title style</a:t>
+            </a:r>
+            <a:endParaRPr lang="en-US" dirty="0"/>
+          </a:p>
+        </p:txBody>
+      </p:sp>
+      <p:sp>
+        <p:nvSpPr>
+          <p:cNvPr id="3" name="Vertical Text Placeholder 2"/>
+          <p:cNvSpPr>
+            <a:spLocks noGrp="1"/>
+          </p:cNvSpPr>
+          <p:nvPr>
+            <p:ph type="body" orient="vert" idx="1"/>
+          </p:nvPr>
+        </p:nvSpPr>
+        <p:spPr>
+          <a:xfrm>
+            <a:off x="677335" y="609600"/>
+            <a:ext cx="7060150" cy="5251450"/>
+          </a:xfrm>
+        </p:spPr>
+        <p:txBody>
           <a:bodyPr vert="eaVert"/>
           <a:lstStyle/>
           <a:p>
-            <a:r>
-              <a:rPr lang="en-US" smtClean="0"/>
-              <a:t>Click to edit Master title style</a:t>
-            </a:r>
-            <a:endParaRPr lang="en-US"/>
-          </a:p>
-        </p:txBody>
-      </p:sp>
-      <p:sp>
-        <p:nvSpPr>
-          <p:cNvPr id="3" name="Vertical Text Placeholder 2"/>
-          <p:cNvSpPr>
-            <a:spLocks noGrp="1"/>
-          </p:cNvSpPr>
-          <p:nvPr>
-            <p:ph type="body" orient="vert" idx="1"/>
-          </p:nvPr>
-        </p:nvSpPr>
-        <p:spPr>
-          <a:xfrm>
-            <a:off x="838200" y="365125"/>
-            <a:ext cx="7734300" cy="5811838"/>
-          </a:xfrm>
-        </p:spPr>
-        <p:txBody>
-          <a:bodyPr vert="eaVert"/>
-          <a:lstStyle/>
-          <a:p>
             <a:pPr lvl="0"/>
             <a:r>
               <a:rPr lang="en-US" smtClean="0"/>
@@ -579,7 +2788,7 @@
               <a:rPr lang="en-US" smtClean="0"/>
               <a:t>Fifth level</a:t>
             </a:r>
-            <a:endParaRPr lang="en-US"/>
+            <a:endParaRPr lang="en-US" dirty="0"/>
           </a:p>
         </p:txBody>
       </p:sp>
@@ -651,7 +2860,7 @@
     </p:spTree>
     <p:extLst>
       <p:ext uri="{BB962C8B-B14F-4D97-AF65-F5344CB8AC3E}">
-        <p14:creationId xmlns:p14="http://schemas.microsoft.com/office/powerpoint/2010/main" val="818576623"/>
+        <p14:creationId xmlns:p14="http://schemas.microsoft.com/office/powerpoint/2010/main" val="3995588926"/>
       </p:ext>
     </p:extLst>
   </p:cSld>
@@ -690,32 +2899,38 @@
         </p:nvSpPr>
         <p:spPr/>
         <p:txBody>
+          <a:bodyPr>
+            <a:normAutofit/>
+          </a:bodyPr>
+          <a:lstStyle>
+            <a:lvl1pPr>
+              <a:defRPr sz="3600"/>
+            </a:lvl1pPr>
+          </a:lstStyle>
+          <a:p>
+            <a:r>
+              <a:rPr lang="en-US" smtClean="0"/>
+              <a:t>Click to edit Master title style</a:t>
+            </a:r>
+            <a:endParaRPr lang="en-US" dirty="0"/>
+          </a:p>
+        </p:txBody>
+      </p:sp>
+      <p:sp>
+        <p:nvSpPr>
+          <p:cNvPr id="3" name="Content Placeholder 2"/>
+          <p:cNvSpPr>
+            <a:spLocks noGrp="1"/>
+          </p:cNvSpPr>
+          <p:nvPr>
+            <p:ph idx="1"/>
+          </p:nvPr>
+        </p:nvSpPr>
+        <p:spPr/>
+        <p:txBody>
           <a:bodyPr/>
           <a:lstStyle/>
           <a:p>
-            <a:r>
-              <a:rPr lang="en-US" smtClean="0"/>
-              <a:t>Click to edit Master title style</a:t>
-            </a:r>
-            <a:endParaRPr lang="en-US"/>
-          </a:p>
-        </p:txBody>
-      </p:sp>
-      <p:sp>
-        <p:nvSpPr>
-          <p:cNvPr id="3" name="Content Placeholder 2"/>
-          <p:cNvSpPr>
-            <a:spLocks noGrp="1"/>
-          </p:cNvSpPr>
-          <p:nvPr>
-            <p:ph idx="1"/>
-          </p:nvPr>
-        </p:nvSpPr>
-        <p:spPr/>
-        <p:txBody>
-          <a:bodyPr/>
-          <a:lstStyle/>
-          <a:p>
             <a:pPr lvl="0"/>
             <a:r>
               <a:rPr lang="en-US" smtClean="0"/>
@@ -749,7 +2964,7 @@
               <a:rPr lang="en-US" smtClean="0"/>
               <a:t>Fifth level</a:t>
             </a:r>
-            <a:endParaRPr lang="en-US"/>
+            <a:endParaRPr lang="en-US" dirty="0"/>
           </a:p>
         </p:txBody>
       </p:sp>
@@ -821,7 +3036,7 @@
     </p:spTree>
     <p:extLst>
       <p:ext uri="{BB962C8B-B14F-4D97-AF65-F5344CB8AC3E}">
-        <p14:creationId xmlns:p14="http://schemas.microsoft.com/office/powerpoint/2010/main" val="1859616734"/>
+        <p14:creationId xmlns:p14="http://schemas.microsoft.com/office/powerpoint/2010/main" val="782843618"/>
       </p:ext>
     </p:extLst>
   </p:cSld>
@@ -860,15 +3075,15 @@
         </p:nvSpPr>
         <p:spPr>
           <a:xfrm>
-            <a:off x="831850" y="1709738"/>
-            <a:ext cx="10515600" cy="2852737"/>
+            <a:off x="677335" y="2700867"/>
+            <a:ext cx="8596668" cy="1826581"/>
           </a:xfrm>
         </p:spPr>
         <p:txBody>
           <a:bodyPr anchor="b"/>
           <a:lstStyle>
-            <a:lvl1pPr>
-              <a:defRPr sz="6000"/>
+            <a:lvl1pPr algn="l">
+              <a:defRPr sz="4000" b="0" cap="none"/>
             </a:lvl1pPr>
           </a:lstStyle>
           <a:p>
@@ -876,7 +3091,7 @@
               <a:rPr lang="en-US" smtClean="0"/>
               <a:t>Click to edit Master title style</a:t>
             </a:r>
-            <a:endParaRPr lang="en-US"/>
+            <a:endParaRPr lang="en-US" dirty="0"/>
           </a:p>
         </p:txBody>
       </p:sp>
@@ -892,26 +3107,27 @@
         </p:nvSpPr>
         <p:spPr>
           <a:xfrm>
-            <a:off x="831850" y="4589463"/>
-            <a:ext cx="10515600" cy="1500187"/>
+            <a:off x="677335" y="4527448"/>
+            <a:ext cx="8596668" cy="860400"/>
           </a:xfrm>
         </p:spPr>
         <p:txBody>
-          <a:bodyPr/>
+          <a:bodyPr anchor="t"/>
           <a:lstStyle>
-            <a:lvl1pPr marL="0" indent="0">
-              <a:buNone/>
-              <a:defRPr sz="2400">
+            <a:lvl1pPr marL="0" indent="0" algn="l">
+              <a:buNone/>
+              <a:defRPr sz="2000">
                 <a:solidFill>
                   <a:schemeClr val="tx1">
-                    <a:tint val="75000"/>
+                    <a:lumMod val="50000"/>
+                    <a:lumOff val="50000"/>
                   </a:schemeClr>
                 </a:solidFill>
               </a:defRPr>
             </a:lvl1pPr>
             <a:lvl2pPr marL="457200" indent="0">
               <a:buNone/>
-              <a:defRPr sz="2000">
+              <a:defRPr sz="1800">
                 <a:solidFill>
                   <a:schemeClr val="tx1">
                     <a:tint val="75000"/>
@@ -921,7 +3137,7 @@
             </a:lvl2pPr>
             <a:lvl3pPr marL="914400" indent="0">
               <a:buNone/>
-              <a:defRPr sz="1800">
+              <a:defRPr sz="1600">
                 <a:solidFill>
                   <a:schemeClr val="tx1">
                     <a:tint val="75000"/>
@@ -931,7 +3147,7 @@
             </a:lvl3pPr>
             <a:lvl4pPr marL="1371600" indent="0">
               <a:buNone/>
-              <a:defRPr sz="1600">
+              <a:defRPr sz="1400">
                 <a:solidFill>
                   <a:schemeClr val="tx1">
                     <a:tint val="75000"/>
@@ -941,7 +3157,7 @@
             </a:lvl4pPr>
             <a:lvl5pPr marL="1828800" indent="0">
               <a:buNone/>
-              <a:defRPr sz="1600">
+              <a:defRPr sz="1400">
                 <a:solidFill>
                   <a:schemeClr val="tx1">
                     <a:tint val="75000"/>
@@ -951,7 +3167,7 @@
             </a:lvl5pPr>
             <a:lvl6pPr marL="2286000" indent="0">
               <a:buNone/>
-              <a:defRPr sz="1600">
+              <a:defRPr sz="1400">
                 <a:solidFill>
                   <a:schemeClr val="tx1">
                     <a:tint val="75000"/>
@@ -961,7 +3177,7 @@
             </a:lvl6pPr>
             <a:lvl7pPr marL="2743200" indent="0">
               <a:buNone/>
-              <a:defRPr sz="1600">
+              <a:defRPr sz="1400">
                 <a:solidFill>
                   <a:schemeClr val="tx1">
                     <a:tint val="75000"/>
@@ -971,7 +3187,7 @@
             </a:lvl7pPr>
             <a:lvl8pPr marL="3200400" indent="0">
               <a:buNone/>
-              <a:defRPr sz="1600">
+              <a:defRPr sz="1400">
                 <a:solidFill>
                   <a:schemeClr val="tx1">
                     <a:tint val="75000"/>
@@ -981,7 +3197,7 @@
             </a:lvl8pPr>
             <a:lvl9pPr marL="3657600" indent="0">
               <a:buNone/>
-              <a:defRPr sz="1600">
+              <a:defRPr sz="1400">
                 <a:solidFill>
                   <a:schemeClr val="tx1">
                     <a:tint val="75000"/>
@@ -1067,7 +3283,7 @@
     </p:spTree>
     <p:extLst>
       <p:ext uri="{BB962C8B-B14F-4D97-AF65-F5344CB8AC3E}">
-        <p14:creationId xmlns:p14="http://schemas.microsoft.com/office/powerpoint/2010/main" val="362099972"/>
+        <p14:creationId xmlns:p14="http://schemas.microsoft.com/office/powerpoint/2010/main" val="1914819122"/>
       </p:ext>
     </p:extLst>
   </p:cSld>
@@ -1113,7 +3329,7 @@
               <a:rPr lang="en-US" smtClean="0"/>
               <a:t>Click to edit Master title style</a:t>
             </a:r>
-            <a:endParaRPr lang="en-US"/>
+            <a:endParaRPr lang="en-US" dirty="0"/>
           </a:p>
         </p:txBody>
       </p:sp>
@@ -1129,8 +3345,8 @@
         </p:nvSpPr>
         <p:spPr>
           <a:xfrm>
-            <a:off x="838200" y="1825625"/>
-            <a:ext cx="5181600" cy="4351338"/>
+            <a:off x="677334" y="2160589"/>
+            <a:ext cx="4184035" cy="3880772"/>
           </a:xfrm>
         </p:spPr>
         <p:txBody>
@@ -1170,7 +3386,7 @@
               <a:rPr lang="en-US" smtClean="0"/>
               <a:t>Fifth level</a:t>
             </a:r>
-            <a:endParaRPr lang="en-US"/>
+            <a:endParaRPr lang="en-US" dirty="0"/>
           </a:p>
         </p:txBody>
       </p:sp>
@@ -1186,8 +3402,8 @@
         </p:nvSpPr>
         <p:spPr>
           <a:xfrm>
-            <a:off x="6172200" y="1825625"/>
-            <a:ext cx="5181600" cy="4351338"/>
+            <a:off x="5089970" y="2160589"/>
+            <a:ext cx="4184034" cy="3880773"/>
           </a:xfrm>
         </p:spPr>
         <p:txBody>
@@ -1227,7 +3443,7 @@
               <a:rPr lang="en-US" smtClean="0"/>
               <a:t>Fifth level</a:t>
             </a:r>
-            <a:endParaRPr lang="en-US"/>
+            <a:endParaRPr lang="en-US" dirty="0"/>
           </a:p>
         </p:txBody>
       </p:sp>
@@ -1299,7 +3515,7 @@
     </p:spTree>
     <p:extLst>
       <p:ext uri="{BB962C8B-B14F-4D97-AF65-F5344CB8AC3E}">
-        <p14:creationId xmlns:p14="http://schemas.microsoft.com/office/powerpoint/2010/main" val="2648982725"/>
+        <p14:creationId xmlns:p14="http://schemas.microsoft.com/office/powerpoint/2010/main" val="1472899440"/>
       </p:ext>
     </p:extLst>
   </p:cSld>
@@ -1336,46 +3552,47 @@
             <p:ph type="title"/>
           </p:nvPr>
         </p:nvSpPr>
+        <p:spPr/>
+        <p:txBody>
+          <a:bodyPr/>
+          <a:lstStyle>
+            <a:lvl1pPr>
+              <a:defRPr/>
+            </a:lvl1pPr>
+          </a:lstStyle>
+          <a:p>
+            <a:r>
+              <a:rPr lang="en-US" smtClean="0"/>
+              <a:t>Click to edit Master title style</a:t>
+            </a:r>
+            <a:endParaRPr lang="en-US" dirty="0"/>
+          </a:p>
+        </p:txBody>
+      </p:sp>
+      <p:sp>
+        <p:nvSpPr>
+          <p:cNvPr id="3" name="Text Placeholder 2"/>
+          <p:cNvSpPr>
+            <a:spLocks noGrp="1"/>
+          </p:cNvSpPr>
+          <p:nvPr>
+            <p:ph type="body" idx="1"/>
+          </p:nvPr>
+        </p:nvSpPr>
         <p:spPr>
           <a:xfrm>
-            <a:off x="839788" y="365125"/>
-            <a:ext cx="10515600" cy="1325563"/>
+            <a:off x="675745" y="2160983"/>
+            <a:ext cx="4185623" cy="576262"/>
           </a:xfrm>
         </p:spPr>
         <p:txBody>
-          <a:bodyPr/>
-          <a:lstStyle/>
-          <a:p>
-            <a:r>
-              <a:rPr lang="en-US" smtClean="0"/>
-              <a:t>Click to edit Master title style</a:t>
-            </a:r>
-            <a:endParaRPr lang="en-US"/>
-          </a:p>
-        </p:txBody>
-      </p:sp>
-      <p:sp>
-        <p:nvSpPr>
-          <p:cNvPr id="3" name="Text Placeholder 2"/>
-          <p:cNvSpPr>
-            <a:spLocks noGrp="1"/>
-          </p:cNvSpPr>
-          <p:nvPr>
-            <p:ph type="body" idx="1"/>
-          </p:nvPr>
-        </p:nvSpPr>
-        <p:spPr>
-          <a:xfrm>
-            <a:off x="839788" y="1681163"/>
-            <a:ext cx="5157787" cy="823912"/>
-          </a:xfrm>
-        </p:spPr>
-        <p:txBody>
-          <a:bodyPr anchor="b"/>
+          <a:bodyPr anchor="b">
+            <a:noAutofit/>
+          </a:bodyPr>
           <a:lstStyle>
             <a:lvl1pPr marL="0" indent="0">
               <a:buNone/>
-              <a:defRPr sz="2400" b="1"/>
+              <a:defRPr sz="2400" b="0"/>
             </a:lvl1pPr>
             <a:lvl2pPr marL="457200" indent="0">
               <a:buNone/>
@@ -1431,12 +3648,14 @@
         </p:nvSpPr>
         <p:spPr>
           <a:xfrm>
-            <a:off x="839788" y="2505075"/>
-            <a:ext cx="5157787" cy="3684588"/>
+            <a:off x="675745" y="2737245"/>
+            <a:ext cx="4185623" cy="3304117"/>
           </a:xfrm>
         </p:spPr>
         <p:txBody>
-          <a:bodyPr/>
+          <a:bodyPr>
+            <a:normAutofit/>
+          </a:bodyPr>
           <a:lstStyle/>
           <a:p>
             <a:pPr lvl="0"/>
@@ -1472,7 +3691,7 @@
               <a:rPr lang="en-US" smtClean="0"/>
               <a:t>Fifth level</a:t>
             </a:r>
-            <a:endParaRPr lang="en-US"/>
+            <a:endParaRPr lang="en-US" dirty="0"/>
           </a:p>
         </p:txBody>
       </p:sp>
@@ -1488,16 +3707,18 @@
         </p:nvSpPr>
         <p:spPr>
           <a:xfrm>
-            <a:off x="6172200" y="1681163"/>
-            <a:ext cx="5183188" cy="823912"/>
+            <a:off x="5088383" y="2160983"/>
+            <a:ext cx="4185618" cy="576262"/>
           </a:xfrm>
         </p:spPr>
         <p:txBody>
-          <a:bodyPr anchor="b"/>
+          <a:bodyPr anchor="b">
+            <a:noAutofit/>
+          </a:bodyPr>
           <a:lstStyle>
             <a:lvl1pPr marL="0" indent="0">
               <a:buNone/>
-              <a:defRPr sz="2400" b="1"/>
+              <a:defRPr sz="2400" b="0"/>
             </a:lvl1pPr>
             <a:lvl2pPr marL="457200" indent="0">
               <a:buNone/>
@@ -1553,12 +3774,14 @@
         </p:nvSpPr>
         <p:spPr>
           <a:xfrm>
-            <a:off x="6172200" y="2505075"/>
-            <a:ext cx="5183188" cy="3684588"/>
+            <a:off x="5088384" y="2737245"/>
+            <a:ext cx="4185617" cy="3304117"/>
           </a:xfrm>
         </p:spPr>
         <p:txBody>
-          <a:bodyPr/>
+          <a:bodyPr>
+            <a:normAutofit/>
+          </a:bodyPr>
           <a:lstStyle/>
           <a:p>
             <a:pPr lvl="0"/>
@@ -1594,7 +3817,7 @@
               <a:rPr lang="en-US" smtClean="0"/>
               <a:t>Fifth level</a:t>
             </a:r>
-            <a:endParaRPr lang="en-US"/>
+            <a:endParaRPr lang="en-US" dirty="0"/>
           </a:p>
         </p:txBody>
       </p:sp>
@@ -1666,7 +3889,7 @@
     </p:spTree>
     <p:extLst>
       <p:ext uri="{BB962C8B-B14F-4D97-AF65-F5344CB8AC3E}">
-        <p14:creationId xmlns:p14="http://schemas.microsoft.com/office/powerpoint/2010/main" val="536887728"/>
+        <p14:creationId xmlns:p14="http://schemas.microsoft.com/office/powerpoint/2010/main" val="925222712"/>
       </p:ext>
     </p:extLst>
   </p:cSld>
@@ -1703,7 +3926,12 @@
             <p:ph type="title"/>
           </p:nvPr>
         </p:nvSpPr>
-        <p:spPr/>
+        <p:spPr>
+          <a:xfrm>
+            <a:off x="677334" y="609600"/>
+            <a:ext cx="8596668" cy="1320800"/>
+          </a:xfrm>
+        </p:spPr>
         <p:txBody>
           <a:bodyPr/>
           <a:lstStyle/>
@@ -1712,7 +3940,7 @@
               <a:rPr lang="en-US" smtClean="0"/>
               <a:t>Click to edit Master title style</a:t>
             </a:r>
-            <a:endParaRPr lang="en-US"/>
+            <a:endParaRPr lang="en-US" dirty="0"/>
           </a:p>
         </p:txBody>
       </p:sp>
@@ -1784,7 +4012,7 @@
     </p:spTree>
     <p:extLst>
       <p:ext uri="{BB962C8B-B14F-4D97-AF65-F5344CB8AC3E}">
-        <p14:creationId xmlns:p14="http://schemas.microsoft.com/office/powerpoint/2010/main" val="604432845"/>
+        <p14:creationId xmlns:p14="http://schemas.microsoft.com/office/powerpoint/2010/main" val="3710439677"/>
       </p:ext>
     </p:extLst>
   </p:cSld>
@@ -1879,7 +4107,7 @@
     </p:spTree>
     <p:extLst>
       <p:ext uri="{BB962C8B-B14F-4D97-AF65-F5344CB8AC3E}">
-        <p14:creationId xmlns:p14="http://schemas.microsoft.com/office/powerpoint/2010/main" val="3572374723"/>
+        <p14:creationId xmlns:p14="http://schemas.microsoft.com/office/powerpoint/2010/main" val="531139290"/>
       </p:ext>
     </p:extLst>
   </p:cSld>
@@ -1918,15 +4146,17 @@
         </p:nvSpPr>
         <p:spPr>
           <a:xfrm>
-            <a:off x="839788" y="457200"/>
-            <a:ext cx="3932237" cy="1600200"/>
+            <a:off x="677334" y="1498604"/>
+            <a:ext cx="3854528" cy="1278466"/>
           </a:xfrm>
         </p:spPr>
         <p:txBody>
-          <a:bodyPr anchor="b"/>
+          <a:bodyPr anchor="b">
+            <a:normAutofit/>
+          </a:bodyPr>
           <a:lstStyle>
             <a:lvl1pPr>
-              <a:defRPr sz="3200"/>
+              <a:defRPr sz="2000"/>
             </a:lvl1pPr>
           </a:lstStyle>
           <a:p>
@@ -1934,7 +4164,7 @@
               <a:rPr lang="en-US" smtClean="0"/>
               <a:t>Click to edit Master title style</a:t>
             </a:r>
-            <a:endParaRPr lang="en-US"/>
+            <a:endParaRPr lang="en-US" dirty="0"/>
           </a:p>
         </p:txBody>
       </p:sp>
@@ -1950,41 +4180,15 @@
         </p:nvSpPr>
         <p:spPr>
           <a:xfrm>
-            <a:off x="5183188" y="987425"/>
-            <a:ext cx="6172200" cy="4873625"/>
+            <a:off x="4760461" y="514924"/>
+            <a:ext cx="4513541" cy="5526437"/>
           </a:xfrm>
         </p:spPr>
         <p:txBody>
-          <a:bodyPr/>
-          <a:lstStyle>
-            <a:lvl1pPr>
-              <a:defRPr sz="3200"/>
-            </a:lvl1pPr>
-            <a:lvl2pPr>
-              <a:defRPr sz="2800"/>
-            </a:lvl2pPr>
-            <a:lvl3pPr>
-              <a:defRPr sz="2400"/>
-            </a:lvl3pPr>
-            <a:lvl4pPr>
-              <a:defRPr sz="2000"/>
-            </a:lvl4pPr>
-            <a:lvl5pPr>
-              <a:defRPr sz="2000"/>
-            </a:lvl5pPr>
-            <a:lvl6pPr>
-              <a:defRPr sz="2000"/>
-            </a:lvl6pPr>
-            <a:lvl7pPr>
-              <a:defRPr sz="2000"/>
-            </a:lvl7pPr>
-            <a:lvl8pPr>
-              <a:defRPr sz="2000"/>
-            </a:lvl8pPr>
-            <a:lvl9pPr>
-              <a:defRPr sz="2000"/>
-            </a:lvl9pPr>
-          </a:lstStyle>
+          <a:bodyPr>
+            <a:normAutofit/>
+          </a:bodyPr>
+          <a:lstStyle/>
           <a:p>
             <a:pPr lvl="0"/>
             <a:r>
@@ -2019,7 +4223,7 @@
               <a:rPr lang="en-US" smtClean="0"/>
               <a:t>Fifth level</a:t>
             </a:r>
-            <a:endParaRPr lang="en-US"/>
+            <a:endParaRPr lang="en-US" dirty="0"/>
           </a:p>
         </p:txBody>
       </p:sp>
@@ -2035,46 +4239,48 @@
         </p:nvSpPr>
         <p:spPr>
           <a:xfrm>
-            <a:off x="839788" y="2057400"/>
-            <a:ext cx="3932237" cy="3811588"/>
+            <a:off x="677334" y="2777069"/>
+            <a:ext cx="3854528" cy="2584449"/>
           </a:xfrm>
         </p:spPr>
         <p:txBody>
-          <a:bodyPr/>
+          <a:bodyPr>
+            <a:normAutofit/>
+          </a:bodyPr>
           <a:lstStyle>
             <a:lvl1pPr marL="0" indent="0">
               <a:buNone/>
-              <a:defRPr sz="1600"/>
+              <a:defRPr sz="1400"/>
             </a:lvl1pPr>
-            <a:lvl2pPr marL="457200" indent="0">
+            <a:lvl2pPr marL="457063" indent="0">
               <a:buNone/>
               <a:defRPr sz="1400"/>
             </a:lvl2pPr>
-            <a:lvl3pPr marL="914400" indent="0">
+            <a:lvl3pPr marL="914126" indent="0">
               <a:buNone/>
               <a:defRPr sz="1200"/>
             </a:lvl3pPr>
-            <a:lvl4pPr marL="1371600" indent="0">
+            <a:lvl4pPr marL="1371189" indent="0">
               <a:buNone/>
               <a:defRPr sz="1000"/>
             </a:lvl4pPr>
-            <a:lvl5pPr marL="1828800" indent="0">
+            <a:lvl5pPr marL="1828251" indent="0">
               <a:buNone/>
               <a:defRPr sz="1000"/>
             </a:lvl5pPr>
-            <a:lvl6pPr marL="2286000" indent="0">
+            <a:lvl6pPr marL="2285314" indent="0">
               <a:buNone/>
               <a:defRPr sz="1000"/>
             </a:lvl6pPr>
-            <a:lvl7pPr marL="2743200" indent="0">
+            <a:lvl7pPr marL="2742377" indent="0">
               <a:buNone/>
               <a:defRPr sz="1000"/>
             </a:lvl7pPr>
-            <a:lvl8pPr marL="3200400" indent="0">
+            <a:lvl8pPr marL="3199440" indent="0">
               <a:buNone/>
               <a:defRPr sz="1000"/>
             </a:lvl8pPr>
-            <a:lvl9pPr marL="3657600" indent="0">
+            <a:lvl9pPr marL="3656503" indent="0">
               <a:buNone/>
               <a:defRPr sz="1000"/>
             </a:lvl9pPr>
@@ -2156,7 +4362,7 @@
     </p:spTree>
     <p:extLst>
       <p:ext uri="{BB962C8B-B14F-4D97-AF65-F5344CB8AC3E}">
-        <p14:creationId xmlns:p14="http://schemas.microsoft.com/office/powerpoint/2010/main" val="2958371478"/>
+        <p14:creationId xmlns:p14="http://schemas.microsoft.com/office/powerpoint/2010/main" val="2413292198"/>
       </p:ext>
     </p:extLst>
   </p:cSld>
@@ -2195,15 +4401,17 @@
         </p:nvSpPr>
         <p:spPr>
           <a:xfrm>
-            <a:off x="839788" y="457200"/>
-            <a:ext cx="3932237" cy="1600200"/>
+            <a:off x="677334" y="4800600"/>
+            <a:ext cx="8596667" cy="566738"/>
           </a:xfrm>
         </p:spPr>
         <p:txBody>
-          <a:bodyPr anchor="b"/>
+          <a:bodyPr anchor="b">
+            <a:normAutofit/>
+          </a:bodyPr>
           <a:lstStyle>
-            <a:lvl1pPr>
-              <a:defRPr sz="3200"/>
+            <a:lvl1pPr algn="l">
+              <a:defRPr sz="2400" b="0"/>
             </a:lvl1pPr>
           </a:lstStyle>
           <a:p>
@@ -2211,7 +4419,7 @@
               <a:rPr lang="en-US" smtClean="0"/>
               <a:t>Click to edit Master title style</a:t>
             </a:r>
-            <a:endParaRPr lang="en-US"/>
+            <a:endParaRPr lang="en-US" dirty="0"/>
           </a:p>
         </p:txBody>
       </p:sp>
@@ -2219,7 +4427,7 @@
         <p:nvSpPr>
           <p:cNvPr id="3" name="Picture Placeholder 2"/>
           <p:cNvSpPr>
-            <a:spLocks noGrp="1"/>
+            <a:spLocks noGrp="1" noChangeAspect="1"/>
           </p:cNvSpPr>
           <p:nvPr>
             <p:ph type="pic" idx="1"/>
@@ -2227,109 +4435,117 @@
         </p:nvSpPr>
         <p:spPr>
           <a:xfrm>
-            <a:off x="5183188" y="987425"/>
-            <a:ext cx="6172200" cy="4873625"/>
+            <a:off x="677334" y="609600"/>
+            <a:ext cx="8596668" cy="3845718"/>
           </a:xfrm>
         </p:spPr>
         <p:txBody>
-          <a:bodyPr/>
+          <a:bodyPr anchor="t">
+            <a:normAutofit/>
+          </a:bodyPr>
           <a:lstStyle>
-            <a:lvl1pPr marL="0" indent="0">
-              <a:buNone/>
-              <a:defRPr sz="3200"/>
-            </a:lvl1pPr>
-            <a:lvl2pPr marL="457200" indent="0">
-              <a:buNone/>
-              <a:defRPr sz="2800"/>
-            </a:lvl2pPr>
-            <a:lvl3pPr marL="914400" indent="0">
-              <a:buNone/>
-              <a:defRPr sz="2400"/>
-            </a:lvl3pPr>
-            <a:lvl4pPr marL="1371600" indent="0">
-              <a:buNone/>
-              <a:defRPr sz="2000"/>
-            </a:lvl4pPr>
-            <a:lvl5pPr marL="1828800" indent="0">
-              <a:buNone/>
-              <a:defRPr sz="2000"/>
-            </a:lvl5pPr>
-            <a:lvl6pPr marL="2286000" indent="0">
-              <a:buNone/>
-              <a:defRPr sz="2000"/>
-            </a:lvl6pPr>
-            <a:lvl7pPr marL="2743200" indent="0">
-              <a:buNone/>
-              <a:defRPr sz="2000"/>
-            </a:lvl7pPr>
-            <a:lvl8pPr marL="3200400" indent="0">
-              <a:buNone/>
-              <a:defRPr sz="2000"/>
-            </a:lvl8pPr>
-            <a:lvl9pPr marL="3657600" indent="0">
-              <a:buNone/>
-              <a:defRPr sz="2000"/>
-            </a:lvl9pPr>
-          </a:lstStyle>
-          <a:p>
-            <a:endParaRPr lang="en-US"/>
-          </a:p>
-        </p:txBody>
-      </p:sp>
-      <p:sp>
-        <p:nvSpPr>
-          <p:cNvPr id="4" name="Text Placeholder 3"/>
-          <p:cNvSpPr>
-            <a:spLocks noGrp="1"/>
-          </p:cNvSpPr>
-          <p:nvPr>
-            <p:ph type="body" sz="half" idx="2"/>
-          </p:nvPr>
-        </p:nvSpPr>
-        <p:spPr>
-          <a:xfrm>
-            <a:off x="839788" y="2057400"/>
-            <a:ext cx="3932237" cy="3811588"/>
-          </a:xfrm>
-        </p:spPr>
-        <p:txBody>
-          <a:bodyPr/>
-          <a:lstStyle>
-            <a:lvl1pPr marL="0" indent="0">
+            <a:lvl1pPr marL="0" indent="0" algn="ctr">
               <a:buNone/>
               <a:defRPr sz="1600"/>
             </a:lvl1pPr>
             <a:lvl2pPr marL="457200" indent="0">
               <a:buNone/>
-              <a:defRPr sz="1400"/>
+              <a:defRPr sz="1600"/>
             </a:lvl2pPr>
             <a:lvl3pPr marL="914400" indent="0">
               <a:buNone/>
-              <a:defRPr sz="1200"/>
+              <a:defRPr sz="1600"/>
             </a:lvl3pPr>
             <a:lvl4pPr marL="1371600" indent="0">
               <a:buNone/>
-              <a:defRPr sz="1000"/>
+              <a:defRPr sz="1600"/>
             </a:lvl4pPr>
             <a:lvl5pPr marL="1828800" indent="0">
               <a:buNone/>
-              <a:defRPr sz="1000"/>
+              <a:defRPr sz="1600"/>
             </a:lvl5pPr>
             <a:lvl6pPr marL="2286000" indent="0">
               <a:buNone/>
-              <a:defRPr sz="1000"/>
+              <a:defRPr sz="1600"/>
             </a:lvl6pPr>
             <a:lvl7pPr marL="2743200" indent="0">
               <a:buNone/>
-              <a:defRPr sz="1000"/>
+              <a:defRPr sz="1600"/>
             </a:lvl7pPr>
             <a:lvl8pPr marL="3200400" indent="0">
               <a:buNone/>
-              <a:defRPr sz="1000"/>
+              <a:defRPr sz="1600"/>
             </a:lvl8pPr>
             <a:lvl9pPr marL="3657600" indent="0">
               <a:buNone/>
+              <a:defRPr sz="1600"/>
+            </a:lvl9pPr>
+          </a:lstStyle>
+          <a:p>
+            <a:r>
+              <a:rPr lang="en-US" smtClean="0"/>
+              <a:t>Click icon to add picture</a:t>
+            </a:r>
+            <a:endParaRPr lang="en-US" dirty="0"/>
+          </a:p>
+        </p:txBody>
+      </p:sp>
+      <p:sp>
+        <p:nvSpPr>
+          <p:cNvPr id="4" name="Text Placeholder 3"/>
+          <p:cNvSpPr>
+            <a:spLocks noGrp="1"/>
+          </p:cNvSpPr>
+          <p:nvPr>
+            <p:ph type="body" sz="half" idx="2"/>
+          </p:nvPr>
+        </p:nvSpPr>
+        <p:spPr>
+          <a:xfrm>
+            <a:off x="677334" y="5367338"/>
+            <a:ext cx="8596667" cy="674024"/>
+          </a:xfrm>
+        </p:spPr>
+        <p:txBody>
+          <a:bodyPr>
+            <a:normAutofit/>
+          </a:bodyPr>
+          <a:lstStyle>
+            <a:lvl1pPr marL="0" indent="0">
+              <a:buNone/>
+              <a:defRPr sz="1200"/>
+            </a:lvl1pPr>
+            <a:lvl2pPr marL="457200" indent="0">
+              <a:buNone/>
+              <a:defRPr sz="1200"/>
+            </a:lvl2pPr>
+            <a:lvl3pPr marL="914400" indent="0">
+              <a:buNone/>
               <a:defRPr sz="1000"/>
+            </a:lvl3pPr>
+            <a:lvl4pPr marL="1371600" indent="0">
+              <a:buNone/>
+              <a:defRPr sz="900"/>
+            </a:lvl4pPr>
+            <a:lvl5pPr marL="1828800" indent="0">
+              <a:buNone/>
+              <a:defRPr sz="900"/>
+            </a:lvl5pPr>
+            <a:lvl6pPr marL="2286000" indent="0">
+              <a:buNone/>
+              <a:defRPr sz="900"/>
+            </a:lvl6pPr>
+            <a:lvl7pPr marL="2743200" indent="0">
+              <a:buNone/>
+              <a:defRPr sz="900"/>
+            </a:lvl7pPr>
+            <a:lvl8pPr marL="3200400" indent="0">
+              <a:buNone/>
+              <a:defRPr sz="900"/>
+            </a:lvl8pPr>
+            <a:lvl9pPr marL="3657600" indent="0">
+              <a:buNone/>
+              <a:defRPr sz="900"/>
             </a:lvl9pPr>
           </a:lstStyle>
           <a:p>
@@ -2409,7 +4625,7 @@
     </p:spTree>
     <p:extLst>
       <p:ext uri="{BB962C8B-B14F-4D97-AF65-F5344CB8AC3E}">
-        <p14:creationId xmlns:p14="http://schemas.microsoft.com/office/powerpoint/2010/main" val="162113788"/>
+        <p14:creationId xmlns:p14="http://schemas.microsoft.com/office/powerpoint/2010/main" val="624484100"/>
       </p:ext>
     </p:extLst>
   </p:cSld>
@@ -2441,6 +4657,536 @@
           <a:chExt cx="0" cy="0"/>
         </a:xfrm>
       </p:grpSpPr>
+      <p:grpSp>
+        <p:nvGrpSpPr>
+          <p:cNvPr id="7" name="Group 6"/>
+          <p:cNvGrpSpPr/>
+          <p:nvPr/>
+        </p:nvGrpSpPr>
+        <p:grpSpPr>
+          <a:xfrm>
+            <a:off x="0" y="-8467"/>
+            <a:ext cx="12192000" cy="6866467"/>
+            <a:chOff x="0" y="-8467"/>
+            <a:chExt cx="12192000" cy="6866467"/>
+          </a:xfrm>
+        </p:grpSpPr>
+        <p:cxnSp>
+          <p:nvCxnSpPr>
+            <p:cNvPr id="20" name="Straight Connector 19"/>
+            <p:cNvCxnSpPr/>
+            <p:nvPr/>
+          </p:nvCxnSpPr>
+          <p:spPr>
+            <a:xfrm>
+              <a:off x="9371012" y="0"/>
+              <a:ext cx="1219200" cy="6858000"/>
+            </a:xfrm>
+            <a:prstGeom prst="line">
+              <a:avLst/>
+            </a:prstGeom>
+            <a:ln w="9525">
+              <a:solidFill>
+                <a:schemeClr val="bg1">
+                  <a:lumMod val="75000"/>
+                </a:schemeClr>
+              </a:solidFill>
+            </a:ln>
+          </p:spPr>
+          <p:style>
+            <a:lnRef idx="2">
+              <a:schemeClr val="accent1"/>
+            </a:lnRef>
+            <a:fillRef idx="0">
+              <a:schemeClr val="accent1"/>
+            </a:fillRef>
+            <a:effectRef idx="1">
+              <a:schemeClr val="accent1"/>
+            </a:effectRef>
+            <a:fontRef idx="minor">
+              <a:schemeClr val="tx1"/>
+            </a:fontRef>
+          </p:style>
+        </p:cxnSp>
+        <p:cxnSp>
+          <p:nvCxnSpPr>
+            <p:cNvPr id="21" name="Straight Connector 20"/>
+            <p:cNvCxnSpPr/>
+            <p:nvPr/>
+          </p:nvCxnSpPr>
+          <p:spPr>
+            <a:xfrm flipH="1">
+              <a:off x="7425267" y="3681413"/>
+              <a:ext cx="4763558" cy="3176587"/>
+            </a:xfrm>
+            <a:prstGeom prst="line">
+              <a:avLst/>
+            </a:prstGeom>
+            <a:ln w="9525">
+              <a:solidFill>
+                <a:schemeClr val="bg1">
+                  <a:lumMod val="85000"/>
+                </a:schemeClr>
+              </a:solidFill>
+            </a:ln>
+          </p:spPr>
+          <p:style>
+            <a:lnRef idx="2">
+              <a:schemeClr val="accent1"/>
+            </a:lnRef>
+            <a:fillRef idx="0">
+              <a:schemeClr val="accent1"/>
+            </a:fillRef>
+            <a:effectRef idx="1">
+              <a:schemeClr val="accent1"/>
+            </a:effectRef>
+            <a:fontRef idx="minor">
+              <a:schemeClr val="tx1"/>
+            </a:fontRef>
+          </p:style>
+        </p:cxnSp>
+        <p:sp>
+          <p:nvSpPr>
+            <p:cNvPr id="22" name="Rectangle 23"/>
+            <p:cNvSpPr/>
+            <p:nvPr/>
+          </p:nvSpPr>
+          <p:spPr>
+            <a:xfrm>
+              <a:off x="9181476" y="-8467"/>
+              <a:ext cx="3007349" cy="6866467"/>
+            </a:xfrm>
+            <a:custGeom>
+              <a:avLst/>
+              <a:gdLst/>
+              <a:ahLst/>
+              <a:cxnLst/>
+              <a:rect l="l" t="t" r="r" b="b"/>
+              <a:pathLst>
+                <a:path w="3007349" h="6866467">
+                  <a:moveTo>
+                    <a:pt x="2045532" y="0"/>
+                  </a:moveTo>
+                  <a:lnTo>
+                    <a:pt x="3007349" y="0"/>
+                  </a:lnTo>
+                  <a:lnTo>
+                    <a:pt x="3007349" y="6866467"/>
+                  </a:lnTo>
+                  <a:lnTo>
+                    <a:pt x="0" y="6866467"/>
+                  </a:lnTo>
+                  <a:lnTo>
+                    <a:pt x="2045532" y="0"/>
+                  </a:lnTo>
+                  <a:close/>
+                </a:path>
+              </a:pathLst>
+            </a:custGeom>
+            <a:solidFill>
+              <a:schemeClr val="accent1">
+                <a:alpha val="30000"/>
+              </a:schemeClr>
+            </a:solidFill>
+            <a:ln>
+              <a:noFill/>
+            </a:ln>
+            <a:effectLst/>
+          </p:spPr>
+          <p:style>
+            <a:lnRef idx="1">
+              <a:schemeClr val="accent1"/>
+            </a:lnRef>
+            <a:fillRef idx="3">
+              <a:schemeClr val="accent1"/>
+            </a:fillRef>
+            <a:effectRef idx="2">
+              <a:schemeClr val="accent1"/>
+            </a:effectRef>
+            <a:fontRef idx="minor">
+              <a:schemeClr val="lt1"/>
+            </a:fontRef>
+          </p:style>
+        </p:sp>
+        <p:sp>
+          <p:nvSpPr>
+            <p:cNvPr id="23" name="Rectangle 25"/>
+            <p:cNvSpPr/>
+            <p:nvPr/>
+          </p:nvSpPr>
+          <p:spPr>
+            <a:xfrm>
+              <a:off x="9603442" y="-8467"/>
+              <a:ext cx="2588558" cy="6866467"/>
+            </a:xfrm>
+            <a:custGeom>
+              <a:avLst/>
+              <a:gdLst/>
+              <a:ahLst/>
+              <a:cxnLst/>
+              <a:rect l="l" t="t" r="r" b="b"/>
+              <a:pathLst>
+                <a:path w="2573311" h="6866467">
+                  <a:moveTo>
+                    <a:pt x="0" y="0"/>
+                  </a:moveTo>
+                  <a:lnTo>
+                    <a:pt x="2573311" y="0"/>
+                  </a:lnTo>
+                  <a:lnTo>
+                    <a:pt x="2573311" y="6866467"/>
+                  </a:lnTo>
+                  <a:lnTo>
+                    <a:pt x="1202336" y="6866467"/>
+                  </a:lnTo>
+                  <a:lnTo>
+                    <a:pt x="0" y="0"/>
+                  </a:lnTo>
+                  <a:close/>
+                </a:path>
+              </a:pathLst>
+            </a:custGeom>
+            <a:solidFill>
+              <a:schemeClr val="accent1">
+                <a:alpha val="20000"/>
+              </a:schemeClr>
+            </a:solidFill>
+            <a:ln>
+              <a:noFill/>
+            </a:ln>
+            <a:effectLst/>
+          </p:spPr>
+          <p:style>
+            <a:lnRef idx="1">
+              <a:schemeClr val="accent1"/>
+            </a:lnRef>
+            <a:fillRef idx="3">
+              <a:schemeClr val="accent1"/>
+            </a:fillRef>
+            <a:effectRef idx="2">
+              <a:schemeClr val="accent1"/>
+            </a:effectRef>
+            <a:fontRef idx="minor">
+              <a:schemeClr val="lt1"/>
+            </a:fontRef>
+          </p:style>
+        </p:sp>
+        <p:sp>
+          <p:nvSpPr>
+            <p:cNvPr id="24" name="Isosceles Triangle 23"/>
+            <p:cNvSpPr/>
+            <p:nvPr/>
+          </p:nvSpPr>
+          <p:spPr>
+            <a:xfrm>
+              <a:off x="8932333" y="3048000"/>
+              <a:ext cx="3259667" cy="3810000"/>
+            </a:xfrm>
+            <a:prstGeom prst="triangle">
+              <a:avLst>
+                <a:gd name="adj" fmla="val 100000"/>
+              </a:avLst>
+            </a:prstGeom>
+            <a:solidFill>
+              <a:schemeClr val="accent2">
+                <a:alpha val="72000"/>
+              </a:schemeClr>
+            </a:solidFill>
+            <a:ln>
+              <a:noFill/>
+            </a:ln>
+            <a:effectLst/>
+          </p:spPr>
+          <p:style>
+            <a:lnRef idx="1">
+              <a:schemeClr val="accent1"/>
+            </a:lnRef>
+            <a:fillRef idx="3">
+              <a:schemeClr val="accent1"/>
+            </a:fillRef>
+            <a:effectRef idx="2">
+              <a:schemeClr val="accent1"/>
+            </a:effectRef>
+            <a:fontRef idx="minor">
+              <a:schemeClr val="lt1"/>
+            </a:fontRef>
+          </p:style>
+        </p:sp>
+        <p:sp>
+          <p:nvSpPr>
+            <p:cNvPr id="25" name="Rectangle 27"/>
+            <p:cNvSpPr/>
+            <p:nvPr/>
+          </p:nvSpPr>
+          <p:spPr>
+            <a:xfrm>
+              <a:off x="9334500" y="-8467"/>
+              <a:ext cx="2854326" cy="6866467"/>
+            </a:xfrm>
+            <a:custGeom>
+              <a:avLst/>
+              <a:gdLst/>
+              <a:ahLst/>
+              <a:cxnLst/>
+              <a:rect l="l" t="t" r="r" b="b"/>
+              <a:pathLst>
+                <a:path w="2858013" h="6866467">
+                  <a:moveTo>
+                    <a:pt x="0" y="0"/>
+                  </a:moveTo>
+                  <a:lnTo>
+                    <a:pt x="2858013" y="0"/>
+                  </a:lnTo>
+                  <a:lnTo>
+                    <a:pt x="2858013" y="6866467"/>
+                  </a:lnTo>
+                  <a:lnTo>
+                    <a:pt x="2473942" y="6866467"/>
+                  </a:lnTo>
+                  <a:lnTo>
+                    <a:pt x="0" y="0"/>
+                  </a:lnTo>
+                  <a:close/>
+                </a:path>
+              </a:pathLst>
+            </a:custGeom>
+            <a:solidFill>
+              <a:schemeClr val="accent2">
+                <a:lumMod val="75000"/>
+                <a:alpha val="70000"/>
+              </a:schemeClr>
+            </a:solidFill>
+            <a:ln>
+              <a:noFill/>
+            </a:ln>
+            <a:effectLst/>
+          </p:spPr>
+          <p:style>
+            <a:lnRef idx="1">
+              <a:schemeClr val="accent1"/>
+            </a:lnRef>
+            <a:fillRef idx="3">
+              <a:schemeClr val="accent1"/>
+            </a:fillRef>
+            <a:effectRef idx="2">
+              <a:schemeClr val="accent1"/>
+            </a:effectRef>
+            <a:fontRef idx="minor">
+              <a:schemeClr val="lt1"/>
+            </a:fontRef>
+          </p:style>
+        </p:sp>
+        <p:sp>
+          <p:nvSpPr>
+            <p:cNvPr id="26" name="Rectangle 28"/>
+            <p:cNvSpPr/>
+            <p:nvPr/>
+          </p:nvSpPr>
+          <p:spPr>
+            <a:xfrm>
+              <a:off x="10898730" y="-8467"/>
+              <a:ext cx="1290094" cy="6866467"/>
+            </a:xfrm>
+            <a:custGeom>
+              <a:avLst/>
+              <a:gdLst/>
+              <a:ahLst/>
+              <a:cxnLst/>
+              <a:rect l="l" t="t" r="r" b="b"/>
+              <a:pathLst>
+                <a:path w="1290094" h="6858000">
+                  <a:moveTo>
+                    <a:pt x="1019735" y="0"/>
+                  </a:moveTo>
+                  <a:lnTo>
+                    <a:pt x="1290094" y="0"/>
+                  </a:lnTo>
+                  <a:lnTo>
+                    <a:pt x="1290094" y="6858000"/>
+                  </a:lnTo>
+                  <a:lnTo>
+                    <a:pt x="0" y="6858000"/>
+                  </a:lnTo>
+                  <a:lnTo>
+                    <a:pt x="1019735" y="0"/>
+                  </a:lnTo>
+                  <a:close/>
+                </a:path>
+              </a:pathLst>
+            </a:custGeom>
+            <a:solidFill>
+              <a:schemeClr val="accent1">
+                <a:lumMod val="60000"/>
+                <a:lumOff val="40000"/>
+                <a:alpha val="70000"/>
+              </a:schemeClr>
+            </a:solidFill>
+            <a:ln>
+              <a:noFill/>
+            </a:ln>
+            <a:effectLst/>
+          </p:spPr>
+          <p:style>
+            <a:lnRef idx="1">
+              <a:schemeClr val="accent1"/>
+            </a:lnRef>
+            <a:fillRef idx="3">
+              <a:schemeClr val="accent1"/>
+            </a:fillRef>
+            <a:effectRef idx="2">
+              <a:schemeClr val="accent1"/>
+            </a:effectRef>
+            <a:fontRef idx="minor">
+              <a:schemeClr val="lt1"/>
+            </a:fontRef>
+          </p:style>
+        </p:sp>
+        <p:sp>
+          <p:nvSpPr>
+            <p:cNvPr id="27" name="Rectangle 29"/>
+            <p:cNvSpPr/>
+            <p:nvPr/>
+          </p:nvSpPr>
+          <p:spPr>
+            <a:xfrm>
+              <a:off x="10938999" y="-8467"/>
+              <a:ext cx="1249825" cy="6866467"/>
+            </a:xfrm>
+            <a:custGeom>
+              <a:avLst/>
+              <a:gdLst/>
+              <a:ahLst/>
+              <a:cxnLst/>
+              <a:rect l="l" t="t" r="r" b="b"/>
+              <a:pathLst>
+                <a:path w="1249825" h="6858000">
+                  <a:moveTo>
+                    <a:pt x="0" y="0"/>
+                  </a:moveTo>
+                  <a:lnTo>
+                    <a:pt x="1249825" y="0"/>
+                  </a:lnTo>
+                  <a:lnTo>
+                    <a:pt x="1249825" y="6858000"/>
+                  </a:lnTo>
+                  <a:lnTo>
+                    <a:pt x="1109382" y="6858000"/>
+                  </a:lnTo>
+                  <a:lnTo>
+                    <a:pt x="0" y="0"/>
+                  </a:lnTo>
+                  <a:close/>
+                </a:path>
+              </a:pathLst>
+            </a:custGeom>
+            <a:solidFill>
+              <a:schemeClr val="accent1">
+                <a:alpha val="65000"/>
+              </a:schemeClr>
+            </a:solidFill>
+            <a:ln>
+              <a:noFill/>
+            </a:ln>
+            <a:effectLst/>
+          </p:spPr>
+          <p:style>
+            <a:lnRef idx="1">
+              <a:schemeClr val="accent1"/>
+            </a:lnRef>
+            <a:fillRef idx="3">
+              <a:schemeClr val="accent1"/>
+            </a:fillRef>
+            <a:effectRef idx="2">
+              <a:schemeClr val="accent1"/>
+            </a:effectRef>
+            <a:fontRef idx="minor">
+              <a:schemeClr val="lt1"/>
+            </a:fontRef>
+          </p:style>
+        </p:sp>
+        <p:sp>
+          <p:nvSpPr>
+            <p:cNvPr id="28" name="Isosceles Triangle 27"/>
+            <p:cNvSpPr/>
+            <p:nvPr/>
+          </p:nvSpPr>
+          <p:spPr>
+            <a:xfrm>
+              <a:off x="10371666" y="3589867"/>
+              <a:ext cx="1817159" cy="3268133"/>
+            </a:xfrm>
+            <a:prstGeom prst="triangle">
+              <a:avLst>
+                <a:gd name="adj" fmla="val 100000"/>
+              </a:avLst>
+            </a:prstGeom>
+            <a:solidFill>
+              <a:schemeClr val="accent1">
+                <a:alpha val="80000"/>
+              </a:schemeClr>
+            </a:solidFill>
+            <a:ln>
+              <a:noFill/>
+            </a:ln>
+            <a:effectLst/>
+          </p:spPr>
+          <p:style>
+            <a:lnRef idx="1">
+              <a:schemeClr val="accent1"/>
+            </a:lnRef>
+            <a:fillRef idx="3">
+              <a:schemeClr val="accent1"/>
+            </a:fillRef>
+            <a:effectRef idx="2">
+              <a:schemeClr val="accent1"/>
+            </a:effectRef>
+            <a:fontRef idx="minor">
+              <a:schemeClr val="lt1"/>
+            </a:fontRef>
+          </p:style>
+        </p:sp>
+        <p:sp>
+          <p:nvSpPr>
+            <p:cNvPr id="29" name="Isosceles Triangle 28"/>
+            <p:cNvSpPr/>
+            <p:nvPr/>
+          </p:nvSpPr>
+          <p:spPr>
+            <a:xfrm>
+              <a:off x="0" y="4013200"/>
+              <a:ext cx="448733" cy="2844800"/>
+            </a:xfrm>
+            <a:prstGeom prst="triangle">
+              <a:avLst>
+                <a:gd name="adj" fmla="val 0"/>
+              </a:avLst>
+            </a:prstGeom>
+            <a:solidFill>
+              <a:schemeClr val="accent1">
+                <a:alpha val="85000"/>
+              </a:schemeClr>
+            </a:solidFill>
+            <a:ln>
+              <a:noFill/>
+            </a:ln>
+            <a:effectLst/>
+          </p:spPr>
+          <p:style>
+            <a:lnRef idx="1">
+              <a:schemeClr val="accent1"/>
+            </a:lnRef>
+            <a:fillRef idx="3">
+              <a:schemeClr val="accent1"/>
+            </a:fillRef>
+            <a:effectRef idx="2">
+              <a:schemeClr val="accent1"/>
+            </a:effectRef>
+            <a:fontRef idx="minor">
+              <a:schemeClr val="lt1"/>
+            </a:fontRef>
+          </p:style>
+        </p:sp>
+      </p:grpSp>
       <p:sp>
         <p:nvSpPr>
           <p:cNvPr id="2" name="Title Placeholder 1"/>
@@ -2453,15 +5199,15 @@
         </p:nvSpPr>
         <p:spPr>
           <a:xfrm>
-            <a:off x="838200" y="365125"/>
-            <a:ext cx="10515600" cy="1325563"/>
+            <a:off x="677334" y="609600"/>
+            <a:ext cx="8596668" cy="1320800"/>
           </a:xfrm>
           <a:prstGeom prst="rect">
             <a:avLst/>
           </a:prstGeom>
         </p:spPr>
         <p:txBody>
-          <a:bodyPr vert="horz" lIns="91440" tIns="45720" rIns="91440" bIns="45720" rtlCol="0" anchor="ctr">
+          <a:bodyPr vert="horz" lIns="91440" tIns="45720" rIns="91440" bIns="45720" rtlCol="0" anchor="t">
             <a:normAutofit/>
           </a:bodyPr>
           <a:lstStyle/>
@@ -2470,7 +5216,7 @@
               <a:rPr lang="en-US" smtClean="0"/>
               <a:t>Click to edit Master title style</a:t>
             </a:r>
-            <a:endParaRPr lang="en-US"/>
+            <a:endParaRPr lang="en-US" dirty="0"/>
           </a:p>
         </p:txBody>
       </p:sp>
@@ -2486,8 +5232,8 @@
         </p:nvSpPr>
         <p:spPr>
           <a:xfrm>
-            <a:off x="838200" y="1825625"/>
-            <a:ext cx="10515600" cy="4351338"/>
+            <a:off x="677334" y="2160589"/>
+            <a:ext cx="8596668" cy="3880773"/>
           </a:xfrm>
           <a:prstGeom prst="rect">
             <a:avLst/>
@@ -2532,7 +5278,7 @@
               <a:rPr lang="en-US" smtClean="0"/>
               <a:t>Fifth level</a:t>
             </a:r>
-            <a:endParaRPr lang="en-US"/>
+            <a:endParaRPr lang="en-US" dirty="0"/>
           </a:p>
         </p:txBody>
       </p:sp>
@@ -2548,8 +5294,8 @@
         </p:nvSpPr>
         <p:spPr>
           <a:xfrm>
-            <a:off x="838200" y="6356350"/>
-            <a:ext cx="2743200" cy="365125"/>
+            <a:off x="7205133" y="6041362"/>
+            <a:ext cx="911939" cy="365125"/>
           </a:xfrm>
           <a:prstGeom prst="rect">
             <a:avLst/>
@@ -2558,8 +5304,8 @@
         <p:txBody>
           <a:bodyPr vert="horz" lIns="91440" tIns="45720" rIns="91440" bIns="45720" rtlCol="0" anchor="ctr"/>
           <a:lstStyle>
-            <a:lvl1pPr algn="l">
-              <a:defRPr sz="1200">
+            <a:lvl1pPr algn="r">
+              <a:defRPr sz="900">
                 <a:solidFill>
                   <a:schemeClr val="tx1">
                     <a:tint val="75000"/>
@@ -2589,8 +5335,8 @@
         </p:nvSpPr>
         <p:spPr>
           <a:xfrm>
-            <a:off x="4038600" y="6356350"/>
-            <a:ext cx="4114800" cy="365125"/>
+            <a:off x="677334" y="6041362"/>
+            <a:ext cx="6297612" cy="365125"/>
           </a:xfrm>
           <a:prstGeom prst="rect">
             <a:avLst/>
@@ -2599,8 +5345,8 @@
         <p:txBody>
           <a:bodyPr vert="horz" lIns="91440" tIns="45720" rIns="91440" bIns="45720" rtlCol="0" anchor="ctr"/>
           <a:lstStyle>
-            <a:lvl1pPr algn="ctr">
-              <a:defRPr sz="1200">
+            <a:lvl1pPr algn="l">
+              <a:defRPr sz="900">
                 <a:solidFill>
                   <a:schemeClr val="tx1">
                     <a:tint val="75000"/>
@@ -2626,8 +5372,8 @@
         </p:nvSpPr>
         <p:spPr>
           <a:xfrm>
-            <a:off x="8610600" y="6356350"/>
-            <a:ext cx="2743200" cy="365125"/>
+            <a:off x="8590663" y="6041362"/>
+            <a:ext cx="683339" cy="365125"/>
           </a:xfrm>
           <a:prstGeom prst="rect">
             <a:avLst/>
@@ -2637,11 +5383,9 @@
           <a:bodyPr vert="horz" lIns="91440" tIns="45720" rIns="91440" bIns="45720" rtlCol="0" anchor="ctr"/>
           <a:lstStyle>
             <a:lvl1pPr algn="r">
-              <a:defRPr sz="1200">
+              <a:defRPr sz="900">
                 <a:solidFill>
-                  <a:schemeClr val="tx1">
-                    <a:tint val="75000"/>
-                  </a:schemeClr>
+                  <a:schemeClr val="accent1"/>
                 </a:solidFill>
               </a:defRPr>
             </a:lvl1pPr>
@@ -2658,201 +5402,322 @@
     </p:spTree>
     <p:extLst>
       <p:ext uri="{BB962C8B-B14F-4D97-AF65-F5344CB8AC3E}">
-        <p14:creationId xmlns:p14="http://schemas.microsoft.com/office/powerpoint/2010/main" val="697376159"/>
+        <p14:creationId xmlns:p14="http://schemas.microsoft.com/office/powerpoint/2010/main" val="126149424"/>
       </p:ext>
     </p:extLst>
   </p:cSld>
   <p:clrMap bg1="lt1" tx1="dk1" bg2="lt2" tx2="dk2" accent1="accent1" accent2="accent2" accent3="accent3" accent4="accent4" accent5="accent5" accent6="accent6" hlink="hlink" folHlink="folHlink"/>
   <p:sldLayoutIdLst>
-    <p:sldLayoutId id="2147483649" r:id="rId1"/>
-    <p:sldLayoutId id="2147483650" r:id="rId2"/>
-    <p:sldLayoutId id="2147483651" r:id="rId3"/>
-    <p:sldLayoutId id="2147483652" r:id="rId4"/>
-    <p:sldLayoutId id="2147483653" r:id="rId5"/>
-    <p:sldLayoutId id="2147483654" r:id="rId6"/>
-    <p:sldLayoutId id="2147483655" r:id="rId7"/>
-    <p:sldLayoutId id="2147483656" r:id="rId8"/>
-    <p:sldLayoutId id="2147483657" r:id="rId9"/>
-    <p:sldLayoutId id="2147483658" r:id="rId10"/>
-    <p:sldLayoutId id="2147483659" r:id="rId11"/>
+    <p:sldLayoutId id="2147483661" r:id="rId1"/>
+    <p:sldLayoutId id="2147483662" r:id="rId2"/>
+    <p:sldLayoutId id="2147483663" r:id="rId3"/>
+    <p:sldLayoutId id="2147483664" r:id="rId4"/>
+    <p:sldLayoutId id="2147483665" r:id="rId5"/>
+    <p:sldLayoutId id="2147483666" r:id="rId6"/>
+    <p:sldLayoutId id="2147483667" r:id="rId7"/>
+    <p:sldLayoutId id="2147483668" r:id="rId8"/>
+    <p:sldLayoutId id="2147483669" r:id="rId9"/>
+    <p:sldLayoutId id="2147483670" r:id="rId10"/>
+    <p:sldLayoutId id="2147483671" r:id="rId11"/>
+    <p:sldLayoutId id="2147483672" r:id="rId12"/>
+    <p:sldLayoutId id="2147483673" r:id="rId13"/>
+    <p:sldLayoutId id="2147483674" r:id="rId14"/>
+    <p:sldLayoutId id="2147483675" r:id="rId15"/>
+    <p:sldLayoutId id="2147483676" r:id="rId16"/>
   </p:sldLayoutIdLst>
   <p:txStyles>
     <p:titleStyle>
-      <a:lvl1pPr algn="l" defTabSz="914400" rtl="0" eaLnBrk="1" latinLnBrk="0" hangingPunct="1">
-        <a:lnSpc>
-          <a:spcPct val="90000"/>
-        </a:lnSpc>
+      <a:lvl1pPr algn="l" defTabSz="457200" rtl="0" eaLnBrk="1" latinLnBrk="0" hangingPunct="1">
         <a:spcBef>
           <a:spcPct val="0"/>
         </a:spcBef>
         <a:buNone/>
-        <a:defRPr sz="4400" kern="1200">
+        <a:defRPr sz="3600" kern="1200">
           <a:solidFill>
-            <a:schemeClr val="tx1"/>
+            <a:schemeClr val="accent1"/>
           </a:solidFill>
           <a:latin typeface="+mj-lt"/>
           <a:ea typeface="+mj-ea"/>
           <a:cs typeface="+mj-cs"/>
         </a:defRPr>
       </a:lvl1pPr>
+      <a:lvl2pPr eaLnBrk="1" hangingPunct="1">
+        <a:defRPr>
+          <a:solidFill>
+            <a:schemeClr val="tx2"/>
+          </a:solidFill>
+        </a:defRPr>
+      </a:lvl2pPr>
+      <a:lvl3pPr eaLnBrk="1" hangingPunct="1">
+        <a:defRPr>
+          <a:solidFill>
+            <a:schemeClr val="tx2"/>
+          </a:solidFill>
+        </a:defRPr>
+      </a:lvl3pPr>
+      <a:lvl4pPr eaLnBrk="1" hangingPunct="1">
+        <a:defRPr>
+          <a:solidFill>
+            <a:schemeClr val="tx2"/>
+          </a:solidFill>
+        </a:defRPr>
+      </a:lvl4pPr>
+      <a:lvl5pPr eaLnBrk="1" hangingPunct="1">
+        <a:defRPr>
+          <a:solidFill>
+            <a:schemeClr val="tx2"/>
+          </a:solidFill>
+        </a:defRPr>
+      </a:lvl5pPr>
+      <a:lvl6pPr eaLnBrk="1" hangingPunct="1">
+        <a:defRPr>
+          <a:solidFill>
+            <a:schemeClr val="tx2"/>
+          </a:solidFill>
+        </a:defRPr>
+      </a:lvl6pPr>
+      <a:lvl7pPr eaLnBrk="1" hangingPunct="1">
+        <a:defRPr>
+          <a:solidFill>
+            <a:schemeClr val="tx2"/>
+          </a:solidFill>
+        </a:defRPr>
+      </a:lvl7pPr>
+      <a:lvl8pPr eaLnBrk="1" hangingPunct="1">
+        <a:defRPr>
+          <a:solidFill>
+            <a:schemeClr val="tx2"/>
+          </a:solidFill>
+        </a:defRPr>
+      </a:lvl8pPr>
+      <a:lvl9pPr eaLnBrk="1" hangingPunct="1">
+        <a:defRPr>
+          <a:solidFill>
+            <a:schemeClr val="tx2"/>
+          </a:solidFill>
+        </a:defRPr>
+      </a:lvl9pPr>
     </p:titleStyle>
     <p:bodyStyle>
-      <a:lvl1pPr marL="228600" indent="-228600" algn="l" defTabSz="914400" rtl="0" eaLnBrk="1" latinLnBrk="0" hangingPunct="1">
-        <a:lnSpc>
-          <a:spcPct val="90000"/>
-        </a:lnSpc>
+      <a:lvl1pPr marL="342900" indent="-342900" algn="l" defTabSz="457200" rtl="0" eaLnBrk="1" latinLnBrk="0" hangingPunct="1">
         <a:spcBef>
           <a:spcPts val="1000"/>
         </a:spcBef>
-        <a:buFont typeface="Arial" panose="020B0604020202020204" pitchFamily="34" charset="0"/>
-        <a:buChar char="•"/>
-        <a:defRPr sz="2800" kern="1200">
+        <a:spcAft>
+          <a:spcPts val="0"/>
+        </a:spcAft>
+        <a:buClr>
+          <a:schemeClr val="accent1"/>
+        </a:buClr>
+        <a:buSzPct val="80000"/>
+        <a:buFont typeface="Wingdings 3" charset="2"/>
+        <a:buChar char=""/>
+        <a:defRPr sz="1800" kern="1200">
           <a:solidFill>
-            <a:schemeClr val="tx1"/>
+            <a:schemeClr val="tx1">
+              <a:lumMod val="75000"/>
+              <a:lumOff val="25000"/>
+            </a:schemeClr>
           </a:solidFill>
           <a:latin typeface="+mn-lt"/>
           <a:ea typeface="+mn-ea"/>
           <a:cs typeface="+mn-cs"/>
         </a:defRPr>
       </a:lvl1pPr>
-      <a:lvl2pPr marL="685800" indent="-228600" algn="l" defTabSz="914400" rtl="0" eaLnBrk="1" latinLnBrk="0" hangingPunct="1">
-        <a:lnSpc>
-          <a:spcPct val="90000"/>
-        </a:lnSpc>
+      <a:lvl2pPr marL="742950" indent="-285750" algn="l" defTabSz="457200" rtl="0" eaLnBrk="1" latinLnBrk="0" hangingPunct="1">
         <a:spcBef>
-          <a:spcPts val="500"/>
+          <a:spcPts val="1000"/>
         </a:spcBef>
-        <a:buFont typeface="Arial" panose="020B0604020202020204" pitchFamily="34" charset="0"/>
-        <a:buChar char="•"/>
-        <a:defRPr sz="2400" kern="1200">
+        <a:spcAft>
+          <a:spcPts val="0"/>
+        </a:spcAft>
+        <a:buClr>
+          <a:schemeClr val="accent1"/>
+        </a:buClr>
+        <a:buSzPct val="80000"/>
+        <a:buFont typeface="Wingdings 3" charset="2"/>
+        <a:buChar char=""/>
+        <a:defRPr sz="1600" kern="1200">
           <a:solidFill>
-            <a:schemeClr val="tx1"/>
+            <a:schemeClr val="tx1">
+              <a:lumMod val="75000"/>
+              <a:lumOff val="25000"/>
+            </a:schemeClr>
           </a:solidFill>
           <a:latin typeface="+mn-lt"/>
           <a:ea typeface="+mn-ea"/>
           <a:cs typeface="+mn-cs"/>
         </a:defRPr>
       </a:lvl2pPr>
-      <a:lvl3pPr marL="1143000" indent="-228600" algn="l" defTabSz="914400" rtl="0" eaLnBrk="1" latinLnBrk="0" hangingPunct="1">
-        <a:lnSpc>
-          <a:spcPct val="90000"/>
-        </a:lnSpc>
+      <a:lvl3pPr marL="1143000" indent="-228600" algn="l" defTabSz="457200" rtl="0" eaLnBrk="1" latinLnBrk="0" hangingPunct="1">
         <a:spcBef>
-          <a:spcPts val="500"/>
+          <a:spcPts val="1000"/>
         </a:spcBef>
-        <a:buFont typeface="Arial" panose="020B0604020202020204" pitchFamily="34" charset="0"/>
-        <a:buChar char="•"/>
-        <a:defRPr sz="2000" kern="1200">
+        <a:spcAft>
+          <a:spcPts val="0"/>
+        </a:spcAft>
+        <a:buClr>
+          <a:schemeClr val="accent1"/>
+        </a:buClr>
+        <a:buSzPct val="80000"/>
+        <a:buFont typeface="Wingdings 3" charset="2"/>
+        <a:buChar char=""/>
+        <a:defRPr sz="1400" kern="1200">
           <a:solidFill>
-            <a:schemeClr val="tx1"/>
+            <a:schemeClr val="tx1">
+              <a:lumMod val="75000"/>
+              <a:lumOff val="25000"/>
+            </a:schemeClr>
           </a:solidFill>
           <a:latin typeface="+mn-lt"/>
           <a:ea typeface="+mn-ea"/>
           <a:cs typeface="+mn-cs"/>
         </a:defRPr>
       </a:lvl3pPr>
-      <a:lvl4pPr marL="1600200" indent="-228600" algn="l" defTabSz="914400" rtl="0" eaLnBrk="1" latinLnBrk="0" hangingPunct="1">
-        <a:lnSpc>
-          <a:spcPct val="90000"/>
-        </a:lnSpc>
+      <a:lvl4pPr marL="1600200" indent="-228600" algn="l" defTabSz="457200" rtl="0" eaLnBrk="1" latinLnBrk="0" hangingPunct="1">
         <a:spcBef>
-          <a:spcPts val="500"/>
+          <a:spcPts val="1000"/>
         </a:spcBef>
-        <a:buFont typeface="Arial" panose="020B0604020202020204" pitchFamily="34" charset="0"/>
-        <a:buChar char="•"/>
-        <a:defRPr sz="1800" kern="1200">
+        <a:spcAft>
+          <a:spcPts val="0"/>
+        </a:spcAft>
+        <a:buClr>
+          <a:schemeClr val="accent1"/>
+        </a:buClr>
+        <a:buSzPct val="80000"/>
+        <a:buFont typeface="Wingdings 3" charset="2"/>
+        <a:buChar char=""/>
+        <a:defRPr sz="1200" kern="1200">
           <a:solidFill>
-            <a:schemeClr val="tx1"/>
+            <a:schemeClr val="tx1">
+              <a:lumMod val="75000"/>
+              <a:lumOff val="25000"/>
+            </a:schemeClr>
           </a:solidFill>
           <a:latin typeface="+mn-lt"/>
           <a:ea typeface="+mn-ea"/>
           <a:cs typeface="+mn-cs"/>
         </a:defRPr>
       </a:lvl4pPr>
-      <a:lvl5pPr marL="2057400" indent="-228600" algn="l" defTabSz="914400" rtl="0" eaLnBrk="1" latinLnBrk="0" hangingPunct="1">
-        <a:lnSpc>
-          <a:spcPct val="90000"/>
-        </a:lnSpc>
+      <a:lvl5pPr marL="2057400" indent="-228600" algn="l" defTabSz="457200" rtl="0" eaLnBrk="1" latinLnBrk="0" hangingPunct="1">
         <a:spcBef>
-          <a:spcPts val="500"/>
+          <a:spcPts val="1000"/>
         </a:spcBef>
-        <a:buFont typeface="Arial" panose="020B0604020202020204" pitchFamily="34" charset="0"/>
-        <a:buChar char="•"/>
-        <a:defRPr sz="1800" kern="1200">
+        <a:spcAft>
+          <a:spcPts val="0"/>
+        </a:spcAft>
+        <a:buClr>
+          <a:schemeClr val="accent1"/>
+        </a:buClr>
+        <a:buSzPct val="80000"/>
+        <a:buFont typeface="Wingdings 3" charset="2"/>
+        <a:buChar char=""/>
+        <a:defRPr sz="1200" kern="1200">
           <a:solidFill>
-            <a:schemeClr val="tx1"/>
+            <a:schemeClr val="tx1">
+              <a:lumMod val="75000"/>
+              <a:lumOff val="25000"/>
+            </a:schemeClr>
           </a:solidFill>
           <a:latin typeface="+mn-lt"/>
           <a:ea typeface="+mn-ea"/>
           <a:cs typeface="+mn-cs"/>
         </a:defRPr>
       </a:lvl5pPr>
-      <a:lvl6pPr marL="2514600" indent="-228600" algn="l" defTabSz="914400" rtl="0" eaLnBrk="1" latinLnBrk="0" hangingPunct="1">
-        <a:lnSpc>
-          <a:spcPct val="90000"/>
-        </a:lnSpc>
+      <a:lvl6pPr marL="2514600" indent="-228600" algn="l" defTabSz="457200" rtl="0" eaLnBrk="1" latinLnBrk="0" hangingPunct="1">
         <a:spcBef>
-          <a:spcPts val="500"/>
+          <a:spcPts val="1000"/>
         </a:spcBef>
-        <a:buFont typeface="Arial" panose="020B0604020202020204" pitchFamily="34" charset="0"/>
-        <a:buChar char="•"/>
-        <a:defRPr sz="1800" kern="1200">
+        <a:spcAft>
+          <a:spcPts val="0"/>
+        </a:spcAft>
+        <a:buClr>
+          <a:schemeClr val="accent1"/>
+        </a:buClr>
+        <a:buSzPct val="80000"/>
+        <a:buFont typeface="Wingdings 3" charset="2"/>
+        <a:buChar char=""/>
+        <a:defRPr sz="1200" kern="1200">
           <a:solidFill>
-            <a:schemeClr val="tx1"/>
+            <a:schemeClr val="tx1">
+              <a:lumMod val="75000"/>
+              <a:lumOff val="25000"/>
+            </a:schemeClr>
           </a:solidFill>
           <a:latin typeface="+mn-lt"/>
           <a:ea typeface="+mn-ea"/>
           <a:cs typeface="+mn-cs"/>
         </a:defRPr>
       </a:lvl6pPr>
-      <a:lvl7pPr marL="2971800" indent="-228600" algn="l" defTabSz="914400" rtl="0" eaLnBrk="1" latinLnBrk="0" hangingPunct="1">
-        <a:lnSpc>
-          <a:spcPct val="90000"/>
-        </a:lnSpc>
+      <a:lvl7pPr marL="2971800" indent="-228600" algn="l" defTabSz="457200" rtl="0" eaLnBrk="1" latinLnBrk="0" hangingPunct="1">
         <a:spcBef>
-          <a:spcPts val="500"/>
+          <a:spcPts val="1000"/>
         </a:spcBef>
-        <a:buFont typeface="Arial" panose="020B0604020202020204" pitchFamily="34" charset="0"/>
-        <a:buChar char="•"/>
-        <a:defRPr sz="1800" kern="1200">
+        <a:spcAft>
+          <a:spcPts val="0"/>
+        </a:spcAft>
+        <a:buClr>
+          <a:schemeClr val="accent1"/>
+        </a:buClr>
+        <a:buSzPct val="80000"/>
+        <a:buFont typeface="Wingdings 3" charset="2"/>
+        <a:buChar char=""/>
+        <a:defRPr sz="1200" kern="1200">
           <a:solidFill>
-            <a:schemeClr val="tx1"/>
+            <a:schemeClr val="tx1">
+              <a:lumMod val="75000"/>
+              <a:lumOff val="25000"/>
+            </a:schemeClr>
           </a:solidFill>
           <a:latin typeface="+mn-lt"/>
           <a:ea typeface="+mn-ea"/>
           <a:cs typeface="+mn-cs"/>
         </a:defRPr>
       </a:lvl7pPr>
-      <a:lvl8pPr marL="3429000" indent="-228600" algn="l" defTabSz="914400" rtl="0" eaLnBrk="1" latinLnBrk="0" hangingPunct="1">
-        <a:lnSpc>
-          <a:spcPct val="90000"/>
-        </a:lnSpc>
+      <a:lvl8pPr marL="3429000" indent="-228600" algn="l" defTabSz="457200" rtl="0" eaLnBrk="1" latinLnBrk="0" hangingPunct="1">
         <a:spcBef>
-          <a:spcPts val="500"/>
+          <a:spcPts val="1000"/>
         </a:spcBef>
-        <a:buFont typeface="Arial" panose="020B0604020202020204" pitchFamily="34" charset="0"/>
-        <a:buChar char="•"/>
-        <a:defRPr sz="1800" kern="1200">
+        <a:spcAft>
+          <a:spcPts val="0"/>
+        </a:spcAft>
+        <a:buClr>
+          <a:schemeClr val="accent1"/>
+        </a:buClr>
+        <a:buSzPct val="80000"/>
+        <a:buFont typeface="Wingdings 3" charset="2"/>
+        <a:buChar char=""/>
+        <a:defRPr sz="1200" kern="1200">
           <a:solidFill>
-            <a:schemeClr val="tx1"/>
+            <a:schemeClr val="tx1">
+              <a:lumMod val="75000"/>
+              <a:lumOff val="25000"/>
+            </a:schemeClr>
           </a:solidFill>
           <a:latin typeface="+mn-lt"/>
           <a:ea typeface="+mn-ea"/>
           <a:cs typeface="+mn-cs"/>
         </a:defRPr>
       </a:lvl8pPr>
-      <a:lvl9pPr marL="3886200" indent="-228600" algn="l" defTabSz="914400" rtl="0" eaLnBrk="1" latinLnBrk="0" hangingPunct="1">
-        <a:lnSpc>
-          <a:spcPct val="90000"/>
-        </a:lnSpc>
+      <a:lvl9pPr marL="3886200" indent="-228600" algn="l" defTabSz="457200" rtl="0" eaLnBrk="1" latinLnBrk="0" hangingPunct="1">
         <a:spcBef>
-          <a:spcPts val="500"/>
+          <a:spcPts val="1000"/>
         </a:spcBef>
-        <a:buFont typeface="Arial" panose="020B0604020202020204" pitchFamily="34" charset="0"/>
-        <a:buChar char="•"/>
-        <a:defRPr sz="1800" kern="1200">
+        <a:spcAft>
+          <a:spcPts val="0"/>
+        </a:spcAft>
+        <a:buClr>
+          <a:schemeClr val="accent1"/>
+        </a:buClr>
+        <a:buSzPct val="80000"/>
+        <a:buFont typeface="Wingdings 3" charset="2"/>
+        <a:buChar char=""/>
+        <a:defRPr sz="1200" kern="1200">
           <a:solidFill>
-            <a:schemeClr val="tx1"/>
+            <a:schemeClr val="tx1">
+              <a:lumMod val="75000"/>
+              <a:lumOff val="25000"/>
+            </a:schemeClr>
           </a:solidFill>
           <a:latin typeface="+mn-lt"/>
           <a:ea typeface="+mn-ea"/>
@@ -2864,7 +5729,7 @@
       <a:defPPr>
         <a:defRPr lang="en-US"/>
       </a:defPPr>
-      <a:lvl1pPr marL="0" algn="l" defTabSz="914400" rtl="0" eaLnBrk="1" latinLnBrk="0" hangingPunct="1">
+      <a:lvl1pPr marL="0" algn="l" defTabSz="457200" rtl="0" eaLnBrk="1" latinLnBrk="0" hangingPunct="1">
         <a:defRPr sz="1800" kern="1200">
           <a:solidFill>
             <a:schemeClr val="tx1"/>
@@ -2874,7 +5739,7 @@
           <a:cs typeface="+mn-cs"/>
         </a:defRPr>
       </a:lvl1pPr>
-      <a:lvl2pPr marL="457200" algn="l" defTabSz="914400" rtl="0" eaLnBrk="1" latinLnBrk="0" hangingPunct="1">
+      <a:lvl2pPr marL="457200" algn="l" defTabSz="457200" rtl="0" eaLnBrk="1" latinLnBrk="0" hangingPunct="1">
         <a:defRPr sz="1800" kern="1200">
           <a:solidFill>
             <a:schemeClr val="tx1"/>
@@ -2884,7 +5749,7 @@
           <a:cs typeface="+mn-cs"/>
         </a:defRPr>
       </a:lvl2pPr>
-      <a:lvl3pPr marL="914400" algn="l" defTabSz="914400" rtl="0" eaLnBrk="1" latinLnBrk="0" hangingPunct="1">
+      <a:lvl3pPr marL="914400" algn="l" defTabSz="457200" rtl="0" eaLnBrk="1" latinLnBrk="0" hangingPunct="1">
         <a:defRPr sz="1800" kern="1200">
           <a:solidFill>
             <a:schemeClr val="tx1"/>
@@ -2894,7 +5759,7 @@
           <a:cs typeface="+mn-cs"/>
         </a:defRPr>
       </a:lvl3pPr>
-      <a:lvl4pPr marL="1371600" algn="l" defTabSz="914400" rtl="0" eaLnBrk="1" latinLnBrk="0" hangingPunct="1">
+      <a:lvl4pPr marL="1371600" algn="l" defTabSz="457200" rtl="0" eaLnBrk="1" latinLnBrk="0" hangingPunct="1">
         <a:defRPr sz="1800" kern="1200">
           <a:solidFill>
             <a:schemeClr val="tx1"/>
@@ -2904,7 +5769,7 @@
           <a:cs typeface="+mn-cs"/>
         </a:defRPr>
       </a:lvl4pPr>
-      <a:lvl5pPr marL="1828800" algn="l" defTabSz="914400" rtl="0" eaLnBrk="1" latinLnBrk="0" hangingPunct="1">
+      <a:lvl5pPr marL="1828800" algn="l" defTabSz="457200" rtl="0" eaLnBrk="1" latinLnBrk="0" hangingPunct="1">
         <a:defRPr sz="1800" kern="1200">
           <a:solidFill>
             <a:schemeClr val="tx1"/>
@@ -2914,7 +5779,7 @@
           <a:cs typeface="+mn-cs"/>
         </a:defRPr>
       </a:lvl5pPr>
-      <a:lvl6pPr marL="2286000" algn="l" defTabSz="914400" rtl="0" eaLnBrk="1" latinLnBrk="0" hangingPunct="1">
+      <a:lvl6pPr marL="2286000" algn="l" defTabSz="457200" rtl="0" eaLnBrk="1" latinLnBrk="0" hangingPunct="1">
         <a:defRPr sz="1800" kern="1200">
           <a:solidFill>
             <a:schemeClr val="tx1"/>
@@ -2924,7 +5789,7 @@
           <a:cs typeface="+mn-cs"/>
         </a:defRPr>
       </a:lvl6pPr>
-      <a:lvl7pPr marL="2743200" algn="l" defTabSz="914400" rtl="0" eaLnBrk="1" latinLnBrk="0" hangingPunct="1">
+      <a:lvl7pPr marL="2743200" algn="l" defTabSz="457200" rtl="0" eaLnBrk="1" latinLnBrk="0" hangingPunct="1">
         <a:defRPr sz="1800" kern="1200">
           <a:solidFill>
             <a:schemeClr val="tx1"/>
@@ -2934,7 +5799,7 @@
           <a:cs typeface="+mn-cs"/>
         </a:defRPr>
       </a:lvl7pPr>
-      <a:lvl8pPr marL="3200400" algn="l" defTabSz="914400" rtl="0" eaLnBrk="1" latinLnBrk="0" hangingPunct="1">
+      <a:lvl8pPr marL="3200400" algn="l" defTabSz="457200" rtl="0" eaLnBrk="1" latinLnBrk="0" hangingPunct="1">
         <a:defRPr sz="1800" kern="1200">
           <a:solidFill>
             <a:schemeClr val="tx1"/>
@@ -2944,7 +5809,7 @@
           <a:cs typeface="+mn-cs"/>
         </a:defRPr>
       </a:lvl8pPr>
-      <a:lvl9pPr marL="3657600" algn="l" defTabSz="914400" rtl="0" eaLnBrk="1" latinLnBrk="0" hangingPunct="1">
+      <a:lvl9pPr marL="3657600" algn="l" defTabSz="457200" rtl="0" eaLnBrk="1" latinLnBrk="0" hangingPunct="1">
         <a:defRPr sz="1800" kern="1200">
           <a:solidFill>
             <a:schemeClr val="tx1"/>
@@ -3668,7 +6533,7 @@
         <p:spPr/>
         <p:txBody>
           <a:bodyPr>
-            <a:normAutofit fontScale="92500"/>
+            <a:normAutofit/>
           </a:bodyPr>
           <a:lstStyle/>
           <a:p>
@@ -4961,7 +7826,7 @@
         <p:spPr/>
         <p:txBody>
           <a:bodyPr>
-            <a:normAutofit lnSpcReduction="10000"/>
+            <a:normAutofit/>
           </a:bodyPr>
           <a:lstStyle/>
           <a:p>
@@ -5117,7 +7982,7 @@
         <p:spPr/>
         <p:txBody>
           <a:bodyPr>
-            <a:normAutofit fontScale="92500" lnSpcReduction="20000"/>
+            <a:normAutofit/>
           </a:bodyPr>
           <a:lstStyle/>
           <a:p>
@@ -5261,7 +8126,7 @@
         <p:spPr/>
         <p:txBody>
           <a:bodyPr>
-            <a:normAutofit lnSpcReduction="10000"/>
+            <a:normAutofit/>
           </a:bodyPr>
           <a:lstStyle/>
           <a:p>
@@ -5407,25 +8272,33 @@
         <p:spPr/>
         <p:txBody>
           <a:bodyPr>
-            <a:normAutofit fontScale="55000" lnSpcReduction="20000"/>
+            <a:normAutofit fontScale="77500" lnSpcReduction="20000"/>
           </a:bodyPr>
           <a:lstStyle/>
           <a:p>
             <a:r>
               <a:rPr lang="vi-VN" dirty="0" smtClean="0"/>
-              <a:t>Lý do thường xuyên nhất dẫn đến quyết định sử dụng kiểm thử tự động là thường xuyên phải thực thi regression test. Từ khi Dev đưa ra bản build mới cho tới khi phiên bản mới tới tay khách hàng chỉ từ 1 đến 2 ngày. Trong thời gian ngắn ngủi này, regression test sẽ được thực thi, nghĩa là một số lượng test case lớn phải được thực thi trong một khoảng thời gian ngắn. Đây là lúc lý tưởng để sử dụng kiểm thử tự động.</a:t>
-            </a:r>
-          </a:p>
-          <a:p>
+              <a:t>Lý do thường xuyên nhất dẫn đến quyết định sử dụng kiểm thử tự động là thường xuyên phải thực thi regression test. Từ khi Dev đưa ra bản build mới cho tới khi phiên bản mới tới tay khách hàng chỉ từ 1 đến 2 ngày. Trong thời gian ngắn ngủi này, regression test sẽ được thực thi, nghĩa là một số lượng test case lớn phải được thực thi trong một khoảng thời gian ngắn. Đây là lúc lý tưởng để sử dụng kiểm thử tự động</a:t>
+            </a:r>
+            <a:r>
+              <a:rPr lang="vi-VN" dirty="0" smtClean="0"/>
+              <a:t>.</a:t>
+            </a:r>
+          </a:p>
+          <a:p>
+            <a:pPr marL="0" indent="0">
+              <a:buNone/>
+            </a:pPr>
             <a:endParaRPr lang="vi-VN" dirty="0" smtClean="0"/>
           </a:p>
           <a:p>
-            <a:endParaRPr lang="vi-VN" dirty="0" smtClean="0"/>
-          </a:p>
-          <a:p>
             <a:r>
               <a:rPr lang="vi-VN" dirty="0" smtClean="0"/>
-              <a:t>Xây dựng một bộ kiểm thử tự động cho những function chính, để thực thi smoke test mỗi khi có build mới cũng là một ý tưởng hay. Đây là công việc rất thường xuyên trước khi thực hiện regression test.</a:t>
+              <a:t>Xây </a:t>
+            </a:r>
+            <a:r>
+              <a:rPr lang="vi-VN" dirty="0" smtClean="0"/>
+              <a:t>dựng một bộ kiểm thử tự động cho những function chính, để thực thi smoke test mỗi khi có build mới cũng là một ý tưởng hay. Đây là công việc rất thường xuyên trước khi thực hiện regression test.</a:t>
             </a:r>
           </a:p>
           <a:p>
@@ -5972,9 +8845,9 @@
 </file>
 
 <file path=ppt/theme/theme1.xml><?xml version="1.0" encoding="utf-8"?>
-<a:theme xmlns:a="http://schemas.openxmlformats.org/drawingml/2006/main" name="Office Theme">
+<a:theme xmlns:a="http://schemas.openxmlformats.org/drawingml/2006/main" name="Facet">
   <a:themeElements>
-    <a:clrScheme name="Office">
+    <a:clrScheme name="Facet">
       <a:dk1>
         <a:sysClr val="windowText" lastClr="000000"/>
       </a:dk1>
@@ -5982,52 +8855,52 @@
         <a:sysClr val="window" lastClr="FFFFFF"/>
       </a:lt1>
       <a:dk2>
-        <a:srgbClr val="44546A"/>
+        <a:srgbClr val="2C3C43"/>
       </a:dk2>
       <a:lt2>
-        <a:srgbClr val="E7E6E6"/>
+        <a:srgbClr val="EBEBEB"/>
       </a:lt2>
       <a:accent1>
-        <a:srgbClr val="5B9BD5"/>
+        <a:srgbClr val="90C226"/>
       </a:accent1>
       <a:accent2>
-        <a:srgbClr val="ED7D31"/>
+        <a:srgbClr val="54A021"/>
       </a:accent2>
       <a:accent3>
-        <a:srgbClr val="A5A5A5"/>
+        <a:srgbClr val="E6B91E"/>
       </a:accent3>
       <a:accent4>
-        <a:srgbClr val="FFC000"/>
+        <a:srgbClr val="E76618"/>
       </a:accent4>
       <a:accent5>
-        <a:srgbClr val="4472C4"/>
+        <a:srgbClr val="C42F1A"/>
       </a:accent5>
       <a:accent6>
-        <a:srgbClr val="70AD47"/>
+        <a:srgbClr val="918655"/>
       </a:accent6>
       <a:hlink>
-        <a:srgbClr val="0563C1"/>
+        <a:srgbClr val="99CA3C"/>
       </a:hlink>
       <a:folHlink>
-        <a:srgbClr val="954F72"/>
+        <a:srgbClr val="B9D181"/>
       </a:folHlink>
     </a:clrScheme>
-    <a:fontScheme name="Office">
+    <a:fontScheme name="Facet">
       <a:majorFont>
-        <a:latin typeface="Calibri Light" panose="020F0302020204030204"/>
+        <a:latin typeface="Trebuchet MS" panose="020B0603020202020204"/>
         <a:ea typeface=""/>
         <a:cs typeface=""/>
-        <a:font script="Jpan" typeface="游ゴシック Light"/>
+        <a:font script="Jpan" typeface="メイリオ"/>
         <a:font script="Hang" typeface="맑은 고딕"/>
-        <a:font script="Hans" typeface="等线 Light"/>
-        <a:font script="Hant" typeface="新細明體"/>
-        <a:font script="Arab" typeface="Times New Roman"/>
-        <a:font script="Hebr" typeface="Times New Roman"/>
-        <a:font script="Thai" typeface="Angsana New"/>
+        <a:font script="Hans" typeface="方正姚体"/>
+        <a:font script="Hant" typeface="微軟正黑體"/>
+        <a:font script="Arab" typeface="Tahoma"/>
+        <a:font script="Hebr" typeface="Arial"/>
+        <a:font script="Thai" typeface="Cordia New"/>
         <a:font script="Ethi" typeface="Nyala"/>
         <a:font script="Beng" typeface="Vrinda"/>
         <a:font script="Gujr" typeface="Shruti"/>
-        <a:font script="Khmr" typeface="MoolBoran"/>
+        <a:font script="Khmr" typeface="DaunPenh"/>
         <a:font script="Knda" typeface="Tunga"/>
         <a:font script="Guru" typeface="Raavi"/>
         <a:font script="Cans" typeface="Euphemia"/>
@@ -6044,21 +8917,21 @@
         <a:font script="Laoo" typeface="DokChampa"/>
         <a:font script="Sinh" typeface="Iskoola Pota"/>
         <a:font script="Mong" typeface="Mongolian Baiti"/>
-        <a:font script="Viet" typeface="Times New Roman"/>
+        <a:font script="Viet" typeface="Tahoma"/>
         <a:font script="Uigh" typeface="Microsoft Uighur"/>
         <a:font script="Geor" typeface="Sylfaen"/>
       </a:majorFont>
       <a:minorFont>
-        <a:latin typeface="Calibri" panose="020F0502020204030204"/>
+        <a:latin typeface="Trebuchet MS" panose="020B0603020202020204"/>
         <a:ea typeface=""/>
         <a:cs typeface=""/>
-        <a:font script="Jpan" typeface="游ゴシック"/>
-        <a:font script="Hang" typeface="맑은 고딕"/>
-        <a:font script="Hans" typeface="等线"/>
-        <a:font script="Hant" typeface="新細明體"/>
-        <a:font script="Arab" typeface="Arial"/>
-        <a:font script="Hebr" typeface="Arial"/>
-        <a:font script="Thai" typeface="Cordia New"/>
+        <a:font script="Jpan" typeface="メイリオ"/>
+        <a:font script="Hang" typeface="HY그래픽M"/>
+        <a:font script="Hans" typeface="华文新魏"/>
+        <a:font script="Hant" typeface="微軟正黑體"/>
+        <a:font script="Arab" typeface="Tahoma"/>
+        <a:font script="Hebr" typeface="Gisha"/>
+        <a:font script="Thai" typeface="IrisUPC"/>
         <a:font script="Ethi" typeface="Nyala"/>
         <a:font script="Beng" typeface="Vrinda"/>
         <a:font script="Gujr" typeface="Shruti"/>
@@ -6084,7 +8957,7 @@
         <a:font script="Geor" typeface="Sylfaen"/>
       </a:minorFont>
     </a:fontScheme>
-    <a:fmtScheme name="Office">
+    <a:fmtScheme name="Facet">
       <a:fillStyleLst>
         <a:solidFill>
           <a:schemeClr val="phClr"/>
@@ -6093,23 +8966,13 @@
           <a:gsLst>
             <a:gs pos="0">
               <a:schemeClr val="phClr">
+                <a:tint val="65000"/>
                 <a:lumMod val="110000"/>
-                <a:satMod val="105000"/>
-                <a:tint val="67000"/>
               </a:schemeClr>
             </a:gs>
-            <a:gs pos="50000">
+            <a:gs pos="88000">
               <a:schemeClr val="phClr">
-                <a:lumMod val="105000"/>
-                <a:satMod val="103000"/>
-                <a:tint val="73000"/>
-              </a:schemeClr>
-            </a:gs>
-            <a:gs pos="100000">
-              <a:schemeClr val="phClr">
-                <a:lumMod val="105000"/>
-                <a:satMod val="109000"/>
-                <a:tint val="81000"/>
+                <a:tint val="90000"/>
               </a:schemeClr>
             </a:gs>
           </a:gsLst>
@@ -6119,23 +8982,14 @@
           <a:gsLst>
             <a:gs pos="0">
               <a:schemeClr val="phClr">
-                <a:satMod val="103000"/>
-                <a:lumMod val="102000"/>
-                <a:tint val="94000"/>
+                <a:tint val="96000"/>
+                <a:lumMod val="100000"/>
               </a:schemeClr>
             </a:gs>
-            <a:gs pos="50000">
+            <a:gs pos="78000">
               <a:schemeClr val="phClr">
-                <a:satMod val="110000"/>
-                <a:lumMod val="100000"/>
-                <a:shade val="100000"/>
-              </a:schemeClr>
-            </a:gs>
-            <a:gs pos="100000">
-              <a:schemeClr val="phClr">
-                <a:lumMod val="99000"/>
-                <a:satMod val="120000"/>
-                <a:shade val="78000"/>
+                <a:shade val="94000"/>
+                <a:lumMod val="94000"/>
               </a:schemeClr>
             </a:gs>
           </a:gsLst>
@@ -6143,26 +8997,23 @@
         </a:gradFill>
       </a:fillStyleLst>
       <a:lnStyleLst>
-        <a:ln w="6350" cap="flat" cmpd="sng" algn="ctr">
+        <a:ln w="12700" cap="rnd" cmpd="sng" algn="ctr">
           <a:solidFill>
             <a:schemeClr val="phClr"/>
           </a:solidFill>
           <a:prstDash val="solid"/>
-          <a:miter lim="800000"/>
         </a:ln>
-        <a:ln w="12700" cap="flat" cmpd="sng" algn="ctr">
+        <a:ln w="19050" cap="rnd" cmpd="sng" algn="ctr">
           <a:solidFill>
             <a:schemeClr val="phClr"/>
           </a:solidFill>
           <a:prstDash val="solid"/>
-          <a:miter lim="800000"/>
         </a:ln>
-        <a:ln w="19050" cap="flat" cmpd="sng" algn="ctr">
+        <a:ln w="25400" cap="rnd" cmpd="sng" algn="ctr">
           <a:solidFill>
             <a:schemeClr val="phClr"/>
           </a:solidFill>
           <a:prstDash val="solid"/>
-          <a:miter lim="800000"/>
         </a:ln>
       </a:lnStyleLst>
       <a:effectStyleLst>
@@ -6170,54 +9021,72 @@
           <a:effectLst/>
         </a:effectStyle>
         <a:effectStyle>
-          <a:effectLst/>
+          <a:effectLst>
+            <a:outerShdw blurRad="38100" dist="25400" dir="5400000" rotWithShape="0">
+              <a:srgbClr val="000000">
+                <a:alpha val="35000"/>
+              </a:srgbClr>
+            </a:outerShdw>
+          </a:effectLst>
         </a:effectStyle>
         <a:effectStyle>
           <a:effectLst>
-            <a:outerShdw blurRad="57150" dist="19050" dir="5400000" algn="ctr" rotWithShape="0">
+            <a:outerShdw blurRad="50800" dist="38100" dir="5400000" rotWithShape="0">
               <a:srgbClr val="000000">
-                <a:alpha val="63000"/>
+                <a:alpha val="35000"/>
               </a:srgbClr>
             </a:outerShdw>
           </a:effectLst>
+          <a:scene3d>
+            <a:camera prst="orthographicFront">
+              <a:rot lat="0" lon="0" rev="0"/>
+            </a:camera>
+            <a:lightRig rig="threePt" dir="tl"/>
+          </a:scene3d>
+          <a:sp3d prstMaterial="plastic">
+            <a:bevelT w="0" h="0"/>
+          </a:sp3d>
         </a:effectStyle>
       </a:effectStyleLst>
       <a:bgFillStyleLst>
         <a:solidFill>
           <a:schemeClr val="phClr"/>
         </a:solidFill>
-        <a:solidFill>
-          <a:schemeClr val="phClr">
-            <a:tint val="95000"/>
-            <a:satMod val="170000"/>
-          </a:schemeClr>
-        </a:solidFill>
         <a:gradFill rotWithShape="1">
           <a:gsLst>
             <a:gs pos="0">
               <a:schemeClr val="phClr">
-                <a:tint val="93000"/>
-                <a:satMod val="150000"/>
-                <a:shade val="98000"/>
-                <a:lumMod val="102000"/>
+                <a:tint val="90000"/>
+                <a:lumMod val="104000"/>
               </a:schemeClr>
             </a:gs>
-            <a:gs pos="50000">
+            <a:gs pos="94000">
               <a:schemeClr val="phClr">
-                <a:tint val="98000"/>
-                <a:satMod val="130000"/>
-                <a:shade val="90000"/>
-                <a:lumMod val="103000"/>
+                <a:shade val="96000"/>
+                <a:lumMod val="82000"/>
+              </a:schemeClr>
+            </a:gs>
+          </a:gsLst>
+          <a:lin ang="5400000" scaled="0"/>
+        </a:gradFill>
+        <a:gradFill rotWithShape="1">
+          <a:gsLst>
+            <a:gs pos="0">
+              <a:schemeClr val="phClr">
+                <a:tint val="90000"/>
+                <a:lumMod val="110000"/>
               </a:schemeClr>
             </a:gs>
             <a:gs pos="100000">
               <a:schemeClr val="phClr">
-                <a:shade val="63000"/>
-                <a:satMod val="120000"/>
+                <a:shade val="94000"/>
+                <a:lumMod val="96000"/>
               </a:schemeClr>
             </a:gs>
           </a:gsLst>
-          <a:lin ang="5400000" scaled="0"/>
+          <a:path path="circle">
+            <a:fillToRect l="50000" t="50000" r="100000" b="100000"/>
+          </a:path>
         </a:gradFill>
       </a:bgFillStyleLst>
     </a:fmtScheme>
@@ -6226,7 +9095,7 @@
   <a:extraClrSchemeLst/>
   <a:extLst>
     <a:ext uri="{05A4C25C-085E-4340-85A3-A5531E510DB2}">
-      <thm15:themeFamily xmlns:thm15="http://schemas.microsoft.com/office/thememl/2012/main" name="Office Theme" id="{62F939B6-93AF-4DB8-9C6B-D6C7DFDC589F}" vid="{4A3C46E8-61CC-4603-A589-7422A47A8E4A}"/>
+      <thm15:themeFamily xmlns:thm15="http://schemas.microsoft.com/office/thememl/2012/main" name="Facet" id="{C0C680CD-088A-49FC-A102-D699147F32B2}" vid="{CFBC31BA-B70F-4F30-BCAA-4F3011E16C4D}"/>
     </a:ext>
   </a:extLst>
 </a:theme>

</xml_diff>